<commit_message>
minor changes to a couple of slides
</commit_message>
<xml_diff>
--- a/PowerPoints/08 - Abstract Syntax Trees.pptx
+++ b/PowerPoints/08 - Abstract Syntax Trees.pptx
@@ -68,8 +68,8 @@
     <p:sldId id="341" r:id="rId56"/>
     <p:sldId id="361" r:id="rId57"/>
     <p:sldId id="362" r:id="rId58"/>
-    <p:sldId id="342" r:id="rId59"/>
-    <p:sldId id="363" r:id="rId60"/>
+    <p:sldId id="370" r:id="rId59"/>
+    <p:sldId id="371" r:id="rId60"/>
     <p:sldId id="364" r:id="rId61"/>
     <p:sldId id="290" r:id="rId62"/>
     <p:sldId id="305" r:id="rId63"/>
@@ -26390,7 +26390,7 @@
               <a:rPr lang="en-US" sz="1750" dirty="0">
                 <a:latin typeface="Consolas" panose="020B0609020204030204" pitchFamily="49" charset="0"/>
               </a:rPr>
-              <a:t>for (expr in </a:t>
+              <a:t>for (Expression expr : </a:t>
             </a:r>
             <a:r>
               <a:rPr lang="en-US" sz="1750" dirty="0" err="1">
@@ -26408,7 +26408,7 @@
           <a:p>
             <a:pPr marL="457200" lvl="1" indent="0">
               <a:spcBef>
-                <a:spcPts val="200"/>
+                <a:spcPts val="100"/>
               </a:spcBef>
               <a:buNone/>
             </a:pPr>
@@ -26422,7 +26422,7 @@
           <a:p>
             <a:pPr marL="457200" lvl="1" indent="0">
               <a:spcBef>
-                <a:spcPts val="200"/>
+                <a:spcPts val="100"/>
               </a:spcBef>
               <a:buNone/>
             </a:pPr>
@@ -26442,13 +26442,13 @@
               <a:rPr lang="en-US" sz="1750" dirty="0">
                 <a:latin typeface="Consolas" panose="020B0609020204030204" pitchFamily="49" charset="0"/>
               </a:rPr>
-              <a:t>()</a:t>
+              <a:t>();</a:t>
             </a:r>
           </a:p>
           <a:p>
             <a:pPr marL="457200" lvl="1" indent="0">
               <a:spcBef>
-                <a:spcPts val="200"/>
+                <a:spcPts val="100"/>
               </a:spcBef>
               <a:buNone/>
             </a:pPr>
@@ -26459,7 +26459,7 @@
           <a:p>
             <a:pPr marL="457200" lvl="1" indent="0">
               <a:spcBef>
-                <a:spcPts val="200"/>
+                <a:spcPts val="100"/>
               </a:spcBef>
               <a:buNone/>
             </a:pPr>
@@ -26467,25 +26467,61 @@
               <a:rPr lang="en-US" sz="1750" dirty="0">
                 <a:latin typeface="Consolas" panose="020B0609020204030204" pitchFamily="49" charset="0"/>
               </a:rPr>
-              <a:t>    if (type is </a:t>
+              <a:t>    if (</a:t>
             </a:r>
             <a:r>
               <a:rPr lang="en-US" sz="1750" dirty="0" err="1">
                 <a:latin typeface="Consolas" panose="020B0609020204030204" pitchFamily="49" charset="0"/>
               </a:rPr>
+              <a:t>getType</a:t>
+            </a:r>
+            <a:r>
+              <a:rPr lang="en-US" sz="1750" dirty="0">
+                <a:latin typeface="Consolas" panose="020B0609020204030204" pitchFamily="49" charset="0"/>
+              </a:rPr>
+              <a:t>() </a:t>
+            </a:r>
+            <a:r>
+              <a:rPr lang="en-US" sz="1750" dirty="0" err="1">
+                <a:latin typeface="Consolas" panose="020B0609020204030204" pitchFamily="49" charset="0"/>
+              </a:rPr>
+              <a:t>instanceof</a:t>
+            </a:r>
+            <a:r>
+              <a:rPr lang="en-US" sz="1750" dirty="0">
+                <a:latin typeface="Consolas" panose="020B0609020204030204" pitchFamily="49" charset="0"/>
+              </a:rPr>
+              <a:t> </a:t>
+            </a:r>
+            <a:r>
+              <a:rPr lang="en-US" sz="1750" dirty="0" err="1">
+                <a:latin typeface="Consolas" panose="020B0609020204030204" pitchFamily="49" charset="0"/>
+              </a:rPr>
               <a:t>ArrayType</a:t>
             </a:r>
             <a:r>
               <a:rPr lang="en-US" sz="1750" dirty="0">
                 <a:latin typeface="Consolas" panose="020B0609020204030204" pitchFamily="49" charset="0"/>
               </a:rPr>
+              <a:t> </a:t>
+            </a:r>
+            <a:r>
+              <a:rPr lang="en-US" sz="1750" dirty="0" err="1">
+                <a:latin typeface="Consolas" panose="020B0609020204030204" pitchFamily="49" charset="0"/>
+              </a:rPr>
+              <a:t>arrayType</a:t>
+            </a:r>
+            <a:r>
+              <a:rPr lang="en-US" sz="1750" dirty="0">
+                <a:latin typeface="Consolas" panose="020B0609020204030204" pitchFamily="49" charset="0"/>
+              </a:rPr>
               <a:t>)</a:t>
             </a:r>
           </a:p>
           <a:p>
             <a:pPr marL="457200" lvl="1" indent="0">
               <a:spcBef>
-                <a:spcPts val="200"/>
+                <a:spcPts val="100"/>
               </a:spcBef>
               <a:buNone/>
             </a:pPr>
@@ -26499,7 +26535,7 @@
           <a:p>
             <a:pPr marL="457200" lvl="1" indent="0">
               <a:spcBef>
-                <a:spcPts val="200"/>
+                <a:spcPts val="100"/>
               </a:spcBef>
               <a:buNone/>
             </a:pPr>
@@ -26507,13 +26543,13 @@
               <a:rPr lang="en-US" sz="1750" dirty="0">
                 <a:latin typeface="Consolas" panose="020B0609020204030204" pitchFamily="49" charset="0"/>
               </a:rPr>
-              <a:t>        // change type to the element type of the array</a:t>
+              <a:t>        // Applying the selector effectively changes the</a:t>
             </a:r>
           </a:p>
           <a:p>
             <a:pPr marL="457200" lvl="1" indent="0">
               <a:spcBef>
-                <a:spcPts val="200"/>
+                <a:spcPts val="100"/>
               </a:spcBef>
               <a:buNone/>
             </a:pPr>
@@ -26521,46 +26557,51 @@
               <a:rPr lang="en-US" sz="1750" dirty="0">
                 <a:latin typeface="Consolas" panose="020B0609020204030204" pitchFamily="49" charset="0"/>
               </a:rPr>
+              <a:t>        // variable's type to the element type of the array.</a:t>
+            </a:r>
+          </a:p>
+          <a:p>
+            <a:pPr marL="457200" lvl="1" indent="0">
+              <a:spcBef>
+                <a:spcPts val="100"/>
+              </a:spcBef>
+              <a:buNone/>
+            </a:pPr>
+            <a:r>
+              <a:rPr lang="en-US" sz="1750" dirty="0">
+                <a:latin typeface="Consolas" panose="020B0609020204030204" pitchFamily="49" charset="0"/>
+              </a:rPr>
               <a:t>        </a:t>
             </a:r>
             <a:r>
               <a:rPr lang="en-US" sz="1750" dirty="0" err="1">
                 <a:latin typeface="Consolas" panose="020B0609020204030204" pitchFamily="49" charset="0"/>
               </a:rPr>
-              <a:t>val</a:t>
+              <a:t>setType</a:t>
             </a:r>
             <a:r>
               <a:rPr lang="en-US" sz="1750" dirty="0">
                 <a:latin typeface="Consolas" panose="020B0609020204030204" pitchFamily="49" charset="0"/>
               </a:rPr>
-              <a:t> </a:t>
+              <a:t>(</a:t>
             </a:r>
             <a:r>
               <a:rPr lang="en-US" sz="1750" dirty="0" err="1">
                 <a:latin typeface="Consolas" panose="020B0609020204030204" pitchFamily="49" charset="0"/>
               </a:rPr>
-              <a:t>arrayType</a:t>
+              <a:t>arrayType.getElementType</a:t>
             </a:r>
             <a:r>
               <a:rPr lang="en-US" sz="1750" dirty="0">
                 <a:latin typeface="Consolas" panose="020B0609020204030204" pitchFamily="49" charset="0"/>
               </a:rPr>
-              <a:t> = type as </a:t>
-            </a:r>
-            <a:r>
-              <a:rPr lang="en-US" sz="1750" dirty="0" err="1">
-                <a:latin typeface="Consolas" panose="020B0609020204030204" pitchFamily="49" charset="0"/>
-              </a:rPr>
-              <a:t>ArrayType</a:t>
-            </a:r>
-            <a:endParaRPr lang="en-US" sz="1750" dirty="0">
-              <a:latin typeface="Consolas" panose="020B0609020204030204" pitchFamily="49" charset="0"/>
-            </a:endParaRPr>
+              <a:t>());</a:t>
+            </a:r>
           </a:p>
           <a:p>
             <a:pPr marL="457200" lvl="1" indent="0">
               <a:spcBef>
-                <a:spcPts val="200"/>
+                <a:spcPts val="100"/>
               </a:spcBef>
               <a:buNone/>
             </a:pPr>
@@ -26568,36 +26609,13 @@
               <a:rPr lang="en-US" sz="1750" dirty="0">
                 <a:latin typeface="Consolas" panose="020B0609020204030204" pitchFamily="49" charset="0"/>
               </a:rPr>
-              <a:t>        type = </a:t>
-            </a:r>
-            <a:r>
-              <a:rPr lang="en-US" sz="1750" dirty="0" err="1">
-                <a:latin typeface="Consolas" panose="020B0609020204030204" pitchFamily="49" charset="0"/>
-              </a:rPr>
-              <a:t>arrayType.elementType</a:t>
-            </a:r>
-            <a:endParaRPr lang="en-US" sz="1750" dirty="0">
-              <a:latin typeface="Consolas" panose="020B0609020204030204" pitchFamily="49" charset="0"/>
-            </a:endParaRPr>
+              <a:t>        ...</a:t>
+            </a:r>
           </a:p>
           <a:p>
             <a:pPr marL="457200" lvl="1" indent="0">
               <a:spcBef>
-                <a:spcPts val="200"/>
-              </a:spcBef>
-              <a:buNone/>
-            </a:pPr>
-            <a:r>
-              <a:rPr lang="en-US" sz="1750" dirty="0">
-                <a:latin typeface="Consolas" panose="020B0609020204030204" pitchFamily="49" charset="0"/>
-              </a:rPr>
-              <a:t>        ...</a:t>
-            </a:r>
-          </a:p>
-          <a:p>
-            <a:pPr marL="457200" lvl="1" indent="0">
-              <a:spcBef>
-                <a:spcPts val="200"/>
+                <a:spcPts val="100"/>
               </a:spcBef>
               <a:buNone/>
             </a:pPr>
@@ -26727,7 +26745,7 @@
     </p:spTree>
     <p:extLst>
       <p:ext uri="{BB962C8B-B14F-4D97-AF65-F5344CB8AC3E}">
-        <p14:creationId xmlns:p14="http://schemas.microsoft.com/office/powerpoint/2010/main" val="3760471126"/>
+        <p14:creationId xmlns:p14="http://schemas.microsoft.com/office/powerpoint/2010/main" val="3561724483"/>
       </p:ext>
     </p:extLst>
   </p:cSld>
@@ -26818,7 +26836,7 @@
           <a:p>
             <a:pPr marL="457200" lvl="1" indent="0">
               <a:spcBef>
-                <a:spcPts val="200"/>
+                <a:spcPts val="100"/>
               </a:spcBef>
               <a:buNone/>
             </a:pPr>
@@ -26826,25 +26844,61 @@
               <a:rPr lang="en-US" sz="1750" dirty="0">
                 <a:latin typeface="Consolas" panose="020B0609020204030204" pitchFamily="49" charset="0"/>
               </a:rPr>
-              <a:t>     else if (type is </a:t>
+              <a:t>    else if (</a:t>
             </a:r>
             <a:r>
               <a:rPr lang="en-US" sz="1750" dirty="0" err="1">
                 <a:latin typeface="Consolas" panose="020B0609020204030204" pitchFamily="49" charset="0"/>
               </a:rPr>
+              <a:t>getType</a:t>
+            </a:r>
+            <a:r>
+              <a:rPr lang="en-US" sz="1750" dirty="0">
+                <a:latin typeface="Consolas" panose="020B0609020204030204" pitchFamily="49" charset="0"/>
+              </a:rPr>
+              <a:t>() </a:t>
+            </a:r>
+            <a:r>
+              <a:rPr lang="en-US" sz="1750" dirty="0" err="1">
+                <a:latin typeface="Consolas" panose="020B0609020204030204" pitchFamily="49" charset="0"/>
+              </a:rPr>
+              <a:t>instanceof</a:t>
+            </a:r>
+            <a:r>
+              <a:rPr lang="en-US" sz="1750" dirty="0">
+                <a:latin typeface="Consolas" panose="020B0609020204030204" pitchFamily="49" charset="0"/>
+              </a:rPr>
+              <a:t> </a:t>
+            </a:r>
+            <a:r>
+              <a:rPr lang="en-US" sz="1750" dirty="0" err="1">
+                <a:latin typeface="Consolas" panose="020B0609020204030204" pitchFamily="49" charset="0"/>
+              </a:rPr>
               <a:t>RecordType</a:t>
             </a:r>
             <a:r>
               <a:rPr lang="en-US" sz="1750" dirty="0">
                 <a:latin typeface="Consolas" panose="020B0609020204030204" pitchFamily="49" charset="0"/>
               </a:rPr>
+              <a:t> </a:t>
+            </a:r>
+            <a:r>
+              <a:rPr lang="en-US" sz="1750" dirty="0" err="1">
+                <a:latin typeface="Consolas" panose="020B0609020204030204" pitchFamily="49" charset="0"/>
+              </a:rPr>
+              <a:t>recType</a:t>
+            </a:r>
+            <a:r>
+              <a:rPr lang="en-US" sz="1750" dirty="0">
+                <a:latin typeface="Consolas" panose="020B0609020204030204" pitchFamily="49" charset="0"/>
+              </a:rPr>
               <a:t>)</a:t>
             </a:r>
           </a:p>
           <a:p>
             <a:pPr marL="457200" lvl="1" indent="0">
               <a:spcBef>
-                <a:spcPts val="200"/>
+                <a:spcPts val="100"/>
               </a:spcBef>
               <a:buNone/>
             </a:pPr>
@@ -26858,7 +26912,7 @@
           <a:p>
             <a:pPr marL="457200" lvl="1" indent="0">
               <a:spcBef>
-                <a:spcPts val="200"/>
+                <a:spcPts val="100"/>
               </a:spcBef>
               <a:buNone/>
             </a:pPr>
@@ -26872,7 +26926,7 @@
           <a:p>
             <a:pPr marL="457200" lvl="1" indent="0">
               <a:spcBef>
-                <a:spcPts val="200"/>
+                <a:spcPts val="100"/>
               </a:spcBef>
               <a:buNone/>
             </a:pPr>
@@ -26886,7 +26940,7 @@
           <a:p>
             <a:pPr marL="457200" lvl="1" indent="0">
               <a:spcBef>
-                <a:spcPts val="200"/>
+                <a:spcPts val="100"/>
               </a:spcBef>
               <a:buNone/>
             </a:pPr>
@@ -26899,18 +26953,45 @@
           </a:p>
           <a:p>
             <a:pPr marL="457200" lvl="1" indent="0">
+              <a:spcBef>
+                <a:spcPts val="100"/>
+              </a:spcBef>
               <a:buNone/>
             </a:pPr>
             <a:r>
               <a:rPr lang="en-US" sz="1750" dirty="0">
                 <a:latin typeface="Consolas" panose="020B0609020204030204" pitchFamily="49" charset="0"/>
               </a:rPr>
-              <a:t>    else if (type is </a:t>
+              <a:t>    else if (</a:t>
             </a:r>
             <a:r>
               <a:rPr lang="en-US" sz="1750" dirty="0" err="1">
                 <a:latin typeface="Consolas" panose="020B0609020204030204" pitchFamily="49" charset="0"/>
               </a:rPr>
+              <a:t>getType</a:t>
+            </a:r>
+            <a:r>
+              <a:rPr lang="en-US" sz="1750" dirty="0">
+                <a:latin typeface="Consolas" panose="020B0609020204030204" pitchFamily="49" charset="0"/>
+              </a:rPr>
+              <a:t>() </a:t>
+            </a:r>
+            <a:r>
+              <a:rPr lang="en-US" sz="1750" dirty="0" err="1">
+                <a:latin typeface="Consolas" panose="020B0609020204030204" pitchFamily="49" charset="0"/>
+              </a:rPr>
+              <a:t>instanceof</a:t>
+            </a:r>
+            <a:r>
+              <a:rPr lang="en-US" sz="1750" dirty="0">
+                <a:latin typeface="Consolas" panose="020B0609020204030204" pitchFamily="49" charset="0"/>
+              </a:rPr>
+              <a:t> </a:t>
+            </a:r>
+            <a:r>
+              <a:rPr lang="en-US" sz="1750" dirty="0" err="1">
+                <a:latin typeface="Consolas" panose="020B0609020204030204" pitchFamily="49" charset="0"/>
+              </a:rPr>
               <a:t>StringType</a:t>
             </a:r>
             <a:r>
@@ -26923,7 +27004,7 @@
           <a:p>
             <a:pPr marL="457200" lvl="1" indent="0">
               <a:spcBef>
-                <a:spcPts val="200"/>
+                <a:spcPts val="100"/>
               </a:spcBef>
               <a:buNone/>
             </a:pPr>
@@ -26937,7 +27018,7 @@
           <a:p>
             <a:pPr marL="457200" lvl="1" indent="0">
               <a:spcBef>
-                <a:spcPts val="200"/>
+                <a:spcPts val="100"/>
               </a:spcBef>
               <a:buNone/>
             </a:pPr>
@@ -26951,7 +27032,7 @@
           <a:p>
             <a:pPr marL="457200" lvl="1" indent="0">
               <a:spcBef>
-                <a:spcPts val="200"/>
+                <a:spcPts val="100"/>
               </a:spcBef>
               <a:buNone/>
             </a:pPr>
@@ -26965,7 +27046,7 @@
           <a:p>
             <a:pPr marL="457200" lvl="1" indent="0">
               <a:spcBef>
-                <a:spcPts val="200"/>
+                <a:spcPts val="100"/>
               </a:spcBef>
               <a:buNone/>
             </a:pPr>
@@ -26979,7 +27060,7 @@
           <a:p>
             <a:pPr marL="457200" lvl="1" indent="0">
               <a:spcBef>
-                <a:spcPts val="200"/>
+                <a:spcPts val="100"/>
               </a:spcBef>
               <a:buNone/>
             </a:pPr>
@@ -26993,7 +27074,7 @@
           <a:p>
             <a:pPr marL="457200" lvl="1" indent="0">
               <a:spcBef>
-                <a:spcPts val="200"/>
+                <a:spcPts val="100"/>
               </a:spcBef>
               <a:buNone/>
             </a:pPr>
@@ -27007,7 +27088,7 @@
           <a:p>
             <a:pPr marL="457200" lvl="1" indent="0">
               <a:spcBef>
-                <a:spcPts val="200"/>
+                <a:spcPts val="100"/>
               </a:spcBef>
               <a:buNone/>
             </a:pPr>
@@ -27021,7 +27102,7 @@
           <a:p>
             <a:pPr marL="457200" lvl="1" indent="0">
               <a:spcBef>
-                <a:spcPts val="200"/>
+                <a:spcPts val="100"/>
               </a:spcBef>
               <a:buNone/>
             </a:pPr>
@@ -27029,37 +27110,63 @@
               <a:rPr lang="en-US" sz="1750" dirty="0">
                 <a:latin typeface="Consolas" panose="020B0609020204030204" pitchFamily="49" charset="0"/>
               </a:rPr>
-              <a:t>        </a:t>
+              <a:t>        var </a:t>
             </a:r>
             <a:r>
               <a:rPr lang="en-US" sz="1750" dirty="0" err="1">
                 <a:latin typeface="Consolas" panose="020B0609020204030204" pitchFamily="49" charset="0"/>
               </a:rPr>
-              <a:t>val</a:t>
+              <a:t>errorMsg</a:t>
             </a:r>
             <a:r>
               <a:rPr lang="en-US" sz="1750" dirty="0">
                 <a:latin typeface="Consolas" panose="020B0609020204030204" pitchFamily="49" charset="0"/>
               </a:rPr>
-              <a:t> </a:t>
+              <a:t> = "Selector expression not allowed ..."</a:t>
+            </a:r>
+          </a:p>
+          <a:p>
+            <a:pPr marL="457200" lvl="1" indent="0">
+              <a:spcBef>
+                <a:spcPts val="100"/>
+              </a:spcBef>
+              <a:buNone/>
+            </a:pPr>
+            <a:r>
+              <a:rPr lang="en-US" sz="1750" dirty="0">
+                <a:latin typeface="Consolas" panose="020B0609020204030204" pitchFamily="49" charset="0"/>
+              </a:rPr>
+              <a:t>        throw error(</a:t>
             </a:r>
             <a:r>
               <a:rPr lang="en-US" sz="1750" dirty="0" err="1">
                 <a:latin typeface="Consolas" panose="020B0609020204030204" pitchFamily="49" charset="0"/>
               </a:rPr>
+              <a:t>expr.getPosition</a:t>
+            </a:r>
+            <a:r>
+              <a:rPr lang="en-US" sz="1750" dirty="0">
+                <a:latin typeface="Consolas" panose="020B0609020204030204" pitchFamily="49" charset="0"/>
+              </a:rPr>
+              <a:t>(), </a:t>
+            </a:r>
+            <a:r>
+              <a:rPr lang="en-US" sz="1750" dirty="0" err="1">
+                <a:latin typeface="Consolas" panose="020B0609020204030204" pitchFamily="49" charset="0"/>
+              </a:rPr>
               <a:t>errorMsg</a:t>
             </a:r>
             <a:r>
               <a:rPr lang="en-US" sz="1750" dirty="0">
                 <a:latin typeface="Consolas" panose="020B0609020204030204" pitchFamily="49" charset="0"/>
               </a:rPr>
-              <a:t> = "Selector expression not allowed ..."</a:t>
+              <a:t>)</a:t>
             </a:r>
           </a:p>
           <a:p>
             <a:pPr marL="457200" lvl="1" indent="0">
               <a:spcBef>
-                <a:spcPts val="200"/>
+                <a:spcPts val="100"/>
               </a:spcBef>
               <a:buNone/>
             </a:pPr>
@@ -27067,51 +27174,27 @@
               <a:rPr lang="en-US" sz="1750" dirty="0">
                 <a:latin typeface="Consolas" panose="020B0609020204030204" pitchFamily="49" charset="0"/>
               </a:rPr>
-              <a:t>        throw error(</a:t>
-            </a:r>
-            <a:r>
-              <a:rPr lang="en-US" sz="1750" dirty="0" err="1">
-                <a:latin typeface="Consolas" panose="020B0609020204030204" pitchFamily="49" charset="0"/>
-              </a:rPr>
-              <a:t>expr.position</a:t>
-            </a:r>
+              <a:t>      }</a:t>
+            </a:r>
+          </a:p>
+          <a:p>
+            <a:pPr marL="457200" lvl="1" indent="0">
+              <a:spcBef>
+                <a:spcPts val="100"/>
+              </a:spcBef>
+              <a:buNone/>
+            </a:pPr>
             <a:r>
               <a:rPr lang="en-US" sz="1750" dirty="0">
                 <a:latin typeface="Consolas" panose="020B0609020204030204" pitchFamily="49" charset="0"/>
               </a:rPr>
-              <a:t>, </a:t>
-            </a:r>
-            <a:r>
-              <a:rPr lang="en-US" sz="1750" dirty="0" err="1">
-                <a:latin typeface="Consolas" panose="020B0609020204030204" pitchFamily="49" charset="0"/>
-              </a:rPr>
-              <a:t>errorMsg</a:t>
-            </a:r>
-            <a:r>
-              <a:rPr lang="en-US" sz="1750" dirty="0">
-                <a:latin typeface="Consolas" panose="020B0609020204030204" pitchFamily="49" charset="0"/>
-              </a:rPr>
-              <a:t>)</a:t>
+              <a:t>  }</a:t>
             </a:r>
           </a:p>
           <a:p>
             <a:pPr marL="457200" lvl="1" indent="0">
               <a:spcBef>
-                <a:spcPts val="200"/>
-              </a:spcBef>
-              <a:buNone/>
-            </a:pPr>
-            <a:r>
-              <a:rPr lang="en-US" sz="1750" dirty="0">
-                <a:latin typeface="Consolas" panose="020B0609020204030204" pitchFamily="49" charset="0"/>
-              </a:rPr>
-              <a:t>      }</a:t>
-            </a:r>
-          </a:p>
-          <a:p>
-            <a:pPr marL="457200" lvl="1" indent="0">
-              <a:spcBef>
-                <a:spcPts val="200"/>
+                <a:spcPts val="100"/>
               </a:spcBef>
               <a:buNone/>
             </a:pPr>
@@ -27195,7 +27278,7 @@
     </p:spTree>
     <p:extLst>
       <p:ext uri="{BB962C8B-B14F-4D97-AF65-F5344CB8AC3E}">
-        <p14:creationId xmlns:p14="http://schemas.microsoft.com/office/powerpoint/2010/main" val="4248239808"/>
+        <p14:creationId xmlns:p14="http://schemas.microsoft.com/office/powerpoint/2010/main" val="2658881417"/>
       </p:ext>
     </p:extLst>
   </p:cSld>

</xml_diff>

<commit_message>
minor improvements to one slide
</commit_message>
<xml_diff>
--- a/PowerPoints/08 - Abstract Syntax Trees.pptx
+++ b/PowerPoints/08 - Abstract Syntax Trees.pptx
@@ -8705,24 +8705,16 @@
               <a:buNone/>
             </a:pPr>
             <a:r>
-              <a:rPr lang="en-US" sz="1800" dirty="0">
-                <a:latin typeface="Consolas" panose="020B0609020204030204" pitchFamily="49" charset="0"/>
-              </a:rPr>
-              <a:t>                    | booleanLiteral .</a:t>
-            </a:r>
-          </a:p>
-          <a:p>
-            <a:pPr marL="0" indent="0">
-              <a:spcBef>
-                <a:spcPts val="100"/>
-              </a:spcBef>
-              <a:buNone/>
-            </a:pPr>
-            <a:r>
-              <a:rPr lang="en-US" sz="1800" dirty="0">
-                <a:latin typeface="Consolas" panose="020B0609020204030204" pitchFamily="49" charset="0"/>
-              </a:rPr>
-              <a:t>    booleanLiteral = "true" | "false" .</a:t>
+              <a:rPr lang="en-US" sz="1800">
+                <a:latin typeface="Consolas" panose="020B0609020204030204" pitchFamily="49" charset="0"/>
+              </a:rPr>
+              <a:t>            | "</a:t>
+            </a:r>
+            <a:r>
+              <a:rPr lang="en-US" sz="1800" dirty="0">
+                <a:latin typeface="Consolas" panose="020B0609020204030204" pitchFamily="49" charset="0"/>
+              </a:rPr>
+              <a:t>true" | "false" .</a:t>
             </a:r>
             <a:endParaRPr lang="en-US" dirty="0"/>
           </a:p>

</xml_diff>

<commit_message>
minor reformatting of several slides
</commit_message>
<xml_diff>
--- a/PowerPoints/08 - Abstract Syntax Trees.pptx
+++ b/PowerPoints/08 - Abstract Syntax Trees.pptx
@@ -68,8 +68,8 @@
     <p:sldId id="341" r:id="rId56"/>
     <p:sldId id="361" r:id="rId57"/>
     <p:sldId id="362" r:id="rId58"/>
-    <p:sldId id="370" r:id="rId59"/>
-    <p:sldId id="371" r:id="rId60"/>
+    <p:sldId id="342" r:id="rId59"/>
+    <p:sldId id="363" r:id="rId60"/>
     <p:sldId id="364" r:id="rId61"/>
     <p:sldId id="290" r:id="rId62"/>
     <p:sldId id="305" r:id="rId63"/>
@@ -6399,7 +6399,7 @@
                 <a:latin typeface="Consolas" pitchFamily="49" charset="0"/>
                 <a:cs typeface="Consolas" pitchFamily="49" charset="0"/>
               </a:rPr>
-              <a:t>    private Token operator;</a:t>
+              <a:t>    private Token      operator;</a:t>
             </a:r>
           </a:p>
           <a:p>
@@ -8705,16 +8705,10 @@
               <a:buNone/>
             </a:pPr>
             <a:r>
-              <a:rPr lang="en-US" sz="1800">
-                <a:latin typeface="Consolas" panose="020B0609020204030204" pitchFamily="49" charset="0"/>
-              </a:rPr>
-              <a:t>            | "</a:t>
-            </a:r>
-            <a:r>
-              <a:rPr lang="en-US" sz="1800" dirty="0">
-                <a:latin typeface="Consolas" panose="020B0609020204030204" pitchFamily="49" charset="0"/>
-              </a:rPr>
-              <a:t>true" | "false" .</a:t>
+              <a:rPr lang="en-US" sz="1800" dirty="0">
+                <a:latin typeface="Consolas" panose="020B0609020204030204" pitchFamily="49" charset="0"/>
+              </a:rPr>
+              <a:t>            | "true" | "false" .</a:t>
             </a:r>
             <a:endParaRPr lang="en-US" dirty="0"/>
           </a:p>
@@ -11293,7 +11287,7 @@
         </p:nvGrpSpPr>
         <p:grpSpPr>
           <a:xfrm>
-            <a:off x="1829889" y="4769934"/>
+            <a:off x="1371600" y="4724400"/>
             <a:ext cx="5488744" cy="1529266"/>
             <a:chOff x="1603550" y="4572000"/>
             <a:chExt cx="5488744" cy="1529266"/>
@@ -12221,7 +12215,7 @@
             <a:pPr algn="l"/>
             <a:r>
               <a:rPr lang="en-US" sz="2000" dirty="0"/>
-              <a:t>three values, GLOBAL, </a:t>
+              <a:t>three values – GLOBAL, </a:t>
             </a:r>
             <a:r>
               <a:rPr lang="en-US" sz="2000" dirty="0">
@@ -14772,7 +14766,7 @@
         </p:nvGrpSpPr>
         <p:grpSpPr>
           <a:xfrm>
-            <a:off x="1828698" y="2895600"/>
+            <a:off x="1676400" y="2895600"/>
             <a:ext cx="5486604" cy="1745177"/>
             <a:chOff x="2507650" y="1940183"/>
             <a:chExt cx="5486604" cy="1745177"/>
@@ -15779,7 +15773,69 @@
               <a:rPr lang="en-US" sz="1800" dirty="0">
                 <a:latin typeface="Consolas" panose="020B0609020204030204" pitchFamily="49" charset="0"/>
               </a:rPr>
-              <a:t>    Declaration decl = idTable.get(scanner.getToken());</a:t>
+              <a:t>    var </a:t>
+            </a:r>
+            <a:r>
+              <a:rPr lang="en-US" sz="1800" dirty="0" err="1">
+                <a:latin typeface="Consolas" panose="020B0609020204030204" pitchFamily="49" charset="0"/>
+              </a:rPr>
+              <a:t>idStr</a:t>
+            </a:r>
+            <a:r>
+              <a:rPr lang="en-US" sz="1800" dirty="0">
+                <a:latin typeface="Consolas" panose="020B0609020204030204" pitchFamily="49" charset="0"/>
+              </a:rPr>
+              <a:t> = </a:t>
+            </a:r>
+            <a:r>
+              <a:rPr lang="en-US" sz="1800" dirty="0" err="1">
+                <a:latin typeface="Consolas" panose="020B0609020204030204" pitchFamily="49" charset="0"/>
+              </a:rPr>
+              <a:t>scanner.getText</a:t>
+            </a:r>
+            <a:r>
+              <a:rPr lang="en-US" sz="1800" dirty="0">
+                <a:latin typeface="Consolas" panose="020B0609020204030204" pitchFamily="49" charset="0"/>
+              </a:rPr>
+              <a:t>();</a:t>
+            </a:r>
+          </a:p>
+          <a:p>
+            <a:pPr marL="182880" indent="0">
+              <a:spcBef>
+                <a:spcPts val="200"/>
+              </a:spcBef>
+              <a:buNone/>
+            </a:pPr>
+            <a:r>
+              <a:rPr lang="en-US" sz="1800" dirty="0">
+                <a:latin typeface="Consolas" panose="020B0609020204030204" pitchFamily="49" charset="0"/>
+              </a:rPr>
+              <a:t>    var </a:t>
+            </a:r>
+            <a:r>
+              <a:rPr lang="en-US" sz="1800" dirty="0" err="1">
+                <a:latin typeface="Consolas" panose="020B0609020204030204" pitchFamily="49" charset="0"/>
+              </a:rPr>
+              <a:t>decl</a:t>
+            </a:r>
+            <a:r>
+              <a:rPr lang="en-US" sz="1800" dirty="0">
+                <a:latin typeface="Consolas" panose="020B0609020204030204" pitchFamily="49" charset="0"/>
+              </a:rPr>
+              <a:t>  = idTable.get(</a:t>
+            </a:r>
+            <a:r>
+              <a:rPr lang="en-US" sz="1800" dirty="0" err="1">
+                <a:latin typeface="Consolas" panose="020B0609020204030204" pitchFamily="49" charset="0"/>
+              </a:rPr>
+              <a:t>idStr</a:t>
+            </a:r>
+            <a:r>
+              <a:rPr lang="en-US" sz="1800" dirty="0">
+                <a:latin typeface="Consolas" panose="020B0609020204030204" pitchFamily="49" charset="0"/>
+              </a:rPr>
+              <a:t>);</a:t>
             </a:r>
           </a:p>
           <a:p>
@@ -16137,7 +16193,7 @@
         <p:spPr>
           <a:xfrm>
             <a:off x="458788" y="1363663"/>
-            <a:ext cx="8503920" cy="4935537"/>
+            <a:ext cx="8229600" cy="4935537"/>
           </a:xfrm>
         </p:spPr>
         <p:txBody>
@@ -16193,7 +16249,7 @@
               <a:rPr lang="en-US" sz="1800" dirty="0">
                 <a:latin typeface="Consolas" panose="020B0609020204030204" pitchFamily="49" charset="0"/>
               </a:rPr>
-              <a:t>Token constId = scanner.getToken();</a:t>
+              <a:t>var constId = scanner.getToken();</a:t>
             </a:r>
           </a:p>
           <a:p>
@@ -16218,42 +16274,22 @@
               <a:buNone/>
             </a:pPr>
             <a:r>
+              <a:rPr lang="en-US" sz="1800" dirty="0">
+                <a:latin typeface="Consolas" panose="020B0609020204030204" pitchFamily="49" charset="0"/>
+              </a:rPr>
+              <a:t>var </a:t>
+            </a:r>
+            <a:r>
               <a:rPr lang="en-US" sz="1800" dirty="0" err="1">
                 <a:latin typeface="Consolas" panose="020B0609020204030204" pitchFamily="49" charset="0"/>
               </a:rPr>
-              <a:t>ConstDecl</a:t>
-            </a:r>
-            <a:r>
-              <a:rPr lang="en-US" sz="1800" dirty="0">
-                <a:latin typeface="Consolas" panose="020B0609020204030204" pitchFamily="49" charset="0"/>
-              </a:rPr>
-              <a:t> </a:t>
-            </a:r>
-            <a:r>
-              <a:rPr lang="en-US" sz="1800" dirty="0" err="1">
-                <a:latin typeface="Consolas" panose="020B0609020204030204" pitchFamily="49" charset="0"/>
-              </a:rPr>
               <a:t>constDecl</a:t>
             </a:r>
             <a:r>
               <a:rPr lang="en-US" sz="1800" dirty="0">
                 <a:latin typeface="Consolas" panose="020B0609020204030204" pitchFamily="49" charset="0"/>
               </a:rPr>
-              <a:t> =</a:t>
-            </a:r>
-          </a:p>
-          <a:p>
-            <a:pPr marL="457200" lvl="1" indent="0">
-              <a:spcBef>
-                <a:spcPts val="200"/>
-              </a:spcBef>
-              <a:buNone/>
-            </a:pPr>
-            <a:r>
-              <a:rPr lang="en-US" sz="1800" dirty="0">
-                <a:latin typeface="Consolas" panose="020B0609020204030204" pitchFamily="49" charset="0"/>
-              </a:rPr>
-              <a:t>                   new ConstDecl(constId, constType, literal);</a:t>
+              <a:t> = new ConstDecl(constId, constType, literal);</a:t>
             </a:r>
           </a:p>
           <a:p>
@@ -16280,7 +16316,7 @@
         </p:nvSpPr>
         <p:spPr bwMode="auto">
           <a:xfrm>
-            <a:off x="3769466" y="5025163"/>
+            <a:off x="3769466" y="4724400"/>
             <a:ext cx="152400" cy="152400"/>
           </a:xfrm>
           <a:prstGeom prst="diamond">
@@ -16344,7 +16380,7 @@
         </p:nvCxnSpPr>
         <p:spPr bwMode="auto">
           <a:xfrm rot="16200000" flipV="1">
-            <a:off x="4995773" y="4027457"/>
+            <a:off x="4995773" y="3726694"/>
             <a:ext cx="196941" cy="2344754"/>
           </a:xfrm>
           <a:prstGeom prst="bentConnector2">
@@ -16371,7 +16407,7 @@
         </p:nvSpPr>
         <p:spPr>
           <a:xfrm>
-            <a:off x="4227439" y="5298304"/>
+            <a:off x="4227439" y="4997541"/>
             <a:ext cx="4078361" cy="1015663"/>
           </a:xfrm>
           <a:prstGeom prst="rect">
@@ -16922,7 +16958,7 @@
           <a:p>
             <a:r>
               <a:rPr lang="en-US" dirty="0"/>
-              <a:t>Using </a:t>
+              <a:t>Example: Using </a:t>
             </a:r>
             <a:r>
               <a:rPr lang="en-US" dirty="0">
@@ -16940,13 +16976,8 @@
             </a:br>
             <a:r>
               <a:rPr lang="en-US" dirty="0"/>
-              <a:t>Occurrences of Identifiers </a:t>
-            </a:r>
-            <a:r>
-              <a:rPr lang="en-US" sz="2400" dirty="0"/>
-              <a:t>(continued)</a:t>
-            </a:r>
-            <a:endParaRPr lang="en-US" dirty="0"/>
+              <a:t>Occurrences of Identifiers</a:t>
+            </a:r>
           </a:p>
         </p:txBody>
       </p:sp>
@@ -16965,381 +16996,385 @@
           <a:bodyPr/>
           <a:lstStyle/>
           <a:p>
-            <a:r>
-              <a:rPr lang="en-US" dirty="0"/>
-              <a:t>Example (in method </a:t>
-            </a:r>
-            <a:r>
-              <a:rPr lang="en-US" dirty="0" err="1">
+            <a:pPr marL="182880" indent="0">
+              <a:spcBef>
+                <a:spcPts val="100"/>
+              </a:spcBef>
+              <a:buNone/>
+            </a:pPr>
+            <a:r>
+              <a:rPr lang="en-US" sz="1800" dirty="0">
+                <a:latin typeface="Consolas" panose="020B0609020204030204" pitchFamily="49" charset="0"/>
+              </a:rPr>
+              <a:t>// in method </a:t>
+            </a:r>
+            <a:r>
+              <a:rPr lang="en-US" sz="1800" dirty="0" err="1">
                 <a:latin typeface="Consolas" panose="020B0609020204030204" pitchFamily="49" charset="0"/>
               </a:rPr>
               <a:t>parseVariableCommon</a:t>
             </a:r>
             <a:r>
-              <a:rPr lang="en-US" dirty="0">
+              <a:rPr lang="en-US" sz="1800" dirty="0">
                 <a:latin typeface="Consolas" panose="020B0609020204030204" pitchFamily="49" charset="0"/>
               </a:rPr>
               <a:t>()</a:t>
             </a:r>
-            <a:r>
-              <a:rPr lang="en-US" dirty="0"/>
-              <a:t>)</a:t>
-            </a:r>
-          </a:p>
-          <a:p>
-            <a:pPr marL="457200" lvl="1" indent="0">
-              <a:spcBef>
-                <a:spcPts val="480"/>
-              </a:spcBef>
-              <a:buNone/>
-            </a:pPr>
-            <a:r>
-              <a:rPr lang="en-US" sz="1700" dirty="0">
-                <a:latin typeface="Consolas" panose="020B0609020204030204" pitchFamily="49" charset="0"/>
-              </a:rPr>
-              <a:t>Token idToken = scanner.getToken();</a:t>
-            </a:r>
-          </a:p>
-          <a:p>
-            <a:pPr marL="457200" lvl="1" indent="0">
-              <a:spcBef>
-                <a:spcPts val="200"/>
-              </a:spcBef>
-              <a:buNone/>
-            </a:pPr>
-            <a:r>
-              <a:rPr lang="en-US" sz="1700" dirty="0">
+          </a:p>
+          <a:p>
+            <a:pPr marL="182880" lvl="1" indent="0">
+              <a:spcBef>
+                <a:spcPts val="100"/>
+              </a:spcBef>
+              <a:buNone/>
+            </a:pPr>
+            <a:r>
+              <a:rPr lang="en-US" sz="1800" dirty="0">
+                <a:latin typeface="Consolas" panose="020B0609020204030204" pitchFamily="49" charset="0"/>
+              </a:rPr>
+              <a:t>var idToken = scanner.getToken();</a:t>
+            </a:r>
+          </a:p>
+          <a:p>
+            <a:pPr marL="182880" lvl="1" indent="0">
+              <a:spcBef>
+                <a:spcPts val="100"/>
+              </a:spcBef>
+              <a:buNone/>
+            </a:pPr>
+            <a:r>
+              <a:rPr lang="en-US" sz="1800" dirty="0">
                 <a:latin typeface="Consolas" panose="020B0609020204030204" pitchFamily="49" charset="0"/>
               </a:rPr>
               <a:t>match(Symbol.identifier);</a:t>
             </a:r>
           </a:p>
           <a:p>
-            <a:pPr marL="457200" lvl="1" indent="0">
-              <a:spcBef>
-                <a:spcPts val="200"/>
-              </a:spcBef>
-              <a:buNone/>
-            </a:pPr>
-            <a:r>
-              <a:rPr lang="en-US" sz="1700" dirty="0">
-                <a:latin typeface="Consolas" panose="020B0609020204030204" pitchFamily="49" charset="0"/>
-              </a:rPr>
-              <a:t>Declaration decl = idTable.get(idToken);</a:t>
-            </a:r>
-          </a:p>
-          <a:p>
-            <a:pPr marL="457200" lvl="1" indent="0">
-              <a:spcBef>
-                <a:spcPts val="200"/>
-              </a:spcBef>
-              <a:buNone/>
-            </a:pPr>
-            <a:endParaRPr lang="en-US" sz="1700" dirty="0">
+            <a:pPr marL="182880" lvl="1" indent="0">
+              <a:spcBef>
+                <a:spcPts val="100"/>
+              </a:spcBef>
+              <a:buNone/>
+            </a:pPr>
+            <a:r>
+              <a:rPr lang="en-US" sz="1800" dirty="0">
+                <a:latin typeface="Consolas" panose="020B0609020204030204" pitchFamily="49" charset="0"/>
+              </a:rPr>
+              <a:t>var decl = idTable.get(idToken);</a:t>
+            </a:r>
+          </a:p>
+          <a:p>
+            <a:pPr marL="182880" lvl="1" indent="0">
+              <a:spcBef>
+                <a:spcPts val="100"/>
+              </a:spcBef>
+              <a:buNone/>
+            </a:pPr>
+            <a:endParaRPr lang="en-US" sz="1800" dirty="0">
               <a:latin typeface="Consolas" panose="020B0609020204030204" pitchFamily="49" charset="0"/>
             </a:endParaRPr>
           </a:p>
           <a:p>
-            <a:pPr marL="457200" lvl="1" indent="0">
-              <a:spcBef>
-                <a:spcPts val="200"/>
-              </a:spcBef>
-              <a:buNone/>
-            </a:pPr>
-            <a:r>
-              <a:rPr lang="en-US" sz="1700" dirty="0">
+            <a:pPr marL="182880" lvl="1" indent="0">
+              <a:spcBef>
+                <a:spcPts val="100"/>
+              </a:spcBef>
+              <a:buNone/>
+            </a:pPr>
+            <a:r>
+              <a:rPr lang="en-US" sz="1800" dirty="0">
                 <a:latin typeface="Consolas" panose="020B0609020204030204" pitchFamily="49" charset="0"/>
               </a:rPr>
               <a:t>if (</a:t>
             </a:r>
             <a:r>
-              <a:rPr lang="en-US" sz="1700" dirty="0" err="1">
+              <a:rPr lang="en-US" sz="1800" dirty="0" err="1">
                 <a:latin typeface="Consolas" panose="020B0609020204030204" pitchFamily="49" charset="0"/>
               </a:rPr>
               <a:t>decl</a:t>
             </a:r>
             <a:r>
-              <a:rPr lang="en-US" sz="1700" dirty="0">
+              <a:rPr lang="en-US" sz="1800" dirty="0">
                 <a:latin typeface="Consolas" panose="020B0609020204030204" pitchFamily="49" charset="0"/>
               </a:rPr>
               <a:t> == null)</a:t>
             </a:r>
           </a:p>
           <a:p>
-            <a:pPr marL="457200" lvl="1" indent="0">
-              <a:spcBef>
-                <a:spcPts val="200"/>
-              </a:spcBef>
-              <a:buNone/>
-            </a:pPr>
-            <a:r>
-              <a:rPr lang="en-US" sz="1700" dirty="0">
+            <a:pPr marL="182880" lvl="1" indent="0">
+              <a:spcBef>
+                <a:spcPts val="100"/>
+              </a:spcBef>
+              <a:buNone/>
+            </a:pPr>
+            <a:r>
+              <a:rPr lang="en-US" sz="1800" dirty="0">
                 <a:latin typeface="Consolas" panose="020B0609020204030204" pitchFamily="49" charset="0"/>
               </a:rPr>
               <a:t>  {</a:t>
             </a:r>
           </a:p>
           <a:p>
-            <a:pPr marL="457200" lvl="1" indent="0">
-              <a:spcBef>
-                <a:spcPts val="200"/>
-              </a:spcBef>
-              <a:buNone/>
-            </a:pPr>
-            <a:r>
-              <a:rPr lang="en-US" sz="1700" dirty="0">
-                <a:latin typeface="Consolas" panose="020B0609020204030204" pitchFamily="49" charset="0"/>
-              </a:rPr>
-              <a:t>    String </a:t>
-            </a:r>
-            <a:r>
-              <a:rPr lang="en-US" sz="1700" dirty="0" err="1">
+            <a:pPr marL="182880" lvl="1" indent="0">
+              <a:spcBef>
+                <a:spcPts val="100"/>
+              </a:spcBef>
+              <a:buNone/>
+            </a:pPr>
+            <a:r>
+              <a:rPr lang="en-US" sz="1800" dirty="0">
+                <a:latin typeface="Consolas" panose="020B0609020204030204" pitchFamily="49" charset="0"/>
+              </a:rPr>
+              <a:t>    var </a:t>
+            </a:r>
+            <a:r>
+              <a:rPr lang="en-US" sz="1800" dirty="0" err="1">
                 <a:latin typeface="Consolas" panose="020B0609020204030204" pitchFamily="49" charset="0"/>
               </a:rPr>
               <a:t>errorMsg</a:t>
             </a:r>
             <a:r>
-              <a:rPr lang="en-US" sz="1700" dirty="0">
+              <a:rPr lang="en-US" sz="1800" dirty="0">
                 <a:latin typeface="Consolas" panose="020B0609020204030204" pitchFamily="49" charset="0"/>
               </a:rPr>
               <a:t> = "Identifier \"" + </a:t>
             </a:r>
             <a:r>
-              <a:rPr lang="en-US" sz="1700" dirty="0" err="1">
+              <a:rPr lang="en-US" sz="1800" dirty="0" err="1">
                 <a:latin typeface="Consolas" panose="020B0609020204030204" pitchFamily="49" charset="0"/>
               </a:rPr>
               <a:t>idToken</a:t>
             </a:r>
-            <a:endParaRPr lang="en-US" sz="1700" dirty="0">
+            <a:endParaRPr lang="en-US" sz="1800" dirty="0">
               <a:latin typeface="Consolas" panose="020B0609020204030204" pitchFamily="49" charset="0"/>
             </a:endParaRPr>
           </a:p>
           <a:p>
-            <a:pPr marL="457200" lvl="1" indent="0">
-              <a:spcBef>
-                <a:spcPts val="200"/>
-              </a:spcBef>
-              <a:buNone/>
-            </a:pPr>
-            <a:r>
-              <a:rPr lang="en-US" sz="1700" dirty="0">
-                <a:latin typeface="Consolas" panose="020B0609020204030204" pitchFamily="49" charset="0"/>
-              </a:rPr>
-              <a:t>                    + "\" has not been declared.";</a:t>
-            </a:r>
-          </a:p>
-          <a:p>
-            <a:pPr marL="457200" lvl="1" indent="0">
-              <a:spcBef>
-                <a:spcPts val="200"/>
-              </a:spcBef>
-              <a:buNone/>
-            </a:pPr>
-            <a:r>
-              <a:rPr lang="en-US" sz="1700" dirty="0">
+            <a:pPr marL="182880" lvl="1" indent="0">
+              <a:spcBef>
+                <a:spcPts val="100"/>
+              </a:spcBef>
+              <a:buNone/>
+            </a:pPr>
+            <a:r>
+              <a:rPr lang="en-US" sz="1800" dirty="0">
+                <a:latin typeface="Consolas" panose="020B0609020204030204" pitchFamily="49" charset="0"/>
+              </a:rPr>
+              <a:t>                 + "\" has not been declared.";</a:t>
+            </a:r>
+          </a:p>
+          <a:p>
+            <a:pPr marL="182880" lvl="1" indent="0">
+              <a:spcBef>
+                <a:spcPts val="100"/>
+              </a:spcBef>
+              <a:buNone/>
+            </a:pPr>
+            <a:r>
+              <a:rPr lang="en-US" sz="1800" dirty="0">
                 <a:latin typeface="Consolas" panose="020B0609020204030204" pitchFamily="49" charset="0"/>
               </a:rPr>
               <a:t>    throw error(</a:t>
             </a:r>
             <a:r>
-              <a:rPr lang="en-US" sz="1700" dirty="0" err="1">
+              <a:rPr lang="en-US" sz="1800" dirty="0" err="1">
                 <a:latin typeface="Consolas" panose="020B0609020204030204" pitchFamily="49" charset="0"/>
               </a:rPr>
               <a:t>idToken.getPosition</a:t>
             </a:r>
             <a:r>
-              <a:rPr lang="en-US" sz="1700" dirty="0">
+              <a:rPr lang="en-US" sz="1800" dirty="0">
                 <a:latin typeface="Consolas" panose="020B0609020204030204" pitchFamily="49" charset="0"/>
               </a:rPr>
               <a:t>(), </a:t>
             </a:r>
             <a:r>
-              <a:rPr lang="en-US" sz="1700" dirty="0" err="1">
+              <a:rPr lang="en-US" sz="1800" dirty="0" err="1">
                 <a:latin typeface="Consolas" panose="020B0609020204030204" pitchFamily="49" charset="0"/>
               </a:rPr>
               <a:t>errorMsg</a:t>
             </a:r>
             <a:r>
-              <a:rPr lang="en-US" sz="1700" dirty="0">
+              <a:rPr lang="en-US" sz="1800" dirty="0">
                 <a:latin typeface="Consolas" panose="020B0609020204030204" pitchFamily="49" charset="0"/>
               </a:rPr>
               <a:t>);</a:t>
             </a:r>
           </a:p>
           <a:p>
-            <a:pPr marL="457200" lvl="1" indent="0">
-              <a:spcBef>
-                <a:spcPts val="200"/>
-              </a:spcBef>
-              <a:buNone/>
-            </a:pPr>
-            <a:r>
-              <a:rPr lang="en-US" sz="1700" dirty="0">
+            <a:pPr marL="182880" lvl="1" indent="0">
+              <a:spcBef>
+                <a:spcPts val="100"/>
+              </a:spcBef>
+              <a:buNone/>
+            </a:pPr>
+            <a:r>
+              <a:rPr lang="en-US" sz="1800" dirty="0">
                 <a:latin typeface="Consolas" panose="020B0609020204030204" pitchFamily="49" charset="0"/>
               </a:rPr>
               <a:t>  }</a:t>
             </a:r>
           </a:p>
           <a:p>
-            <a:pPr marL="457200" lvl="1" indent="0">
-              <a:spcBef>
-                <a:spcPts val="200"/>
-              </a:spcBef>
-              <a:buNone/>
-            </a:pPr>
-            <a:r>
-              <a:rPr lang="en-US" sz="1700" dirty="0">
+            <a:pPr marL="182880" lvl="1" indent="0">
+              <a:spcBef>
+                <a:spcPts val="100"/>
+              </a:spcBef>
+              <a:buNone/>
+            </a:pPr>
+            <a:r>
+              <a:rPr lang="en-US" sz="1800" dirty="0">
                 <a:latin typeface="Consolas" panose="020B0609020204030204" pitchFamily="49" charset="0"/>
               </a:rPr>
               <a:t>else if (!(</a:t>
             </a:r>
             <a:r>
-              <a:rPr lang="en-US" sz="1700" b="1" dirty="0" err="1">
+              <a:rPr lang="en-US" sz="1800" b="1" dirty="0" err="1">
                 <a:latin typeface="Consolas" panose="020B0609020204030204" pitchFamily="49" charset="0"/>
               </a:rPr>
               <a:t>decl</a:t>
             </a:r>
             <a:r>
-              <a:rPr lang="en-US" sz="1700" b="1" dirty="0">
+              <a:rPr lang="en-US" sz="1800" b="1" dirty="0">
                 <a:latin typeface="Consolas" panose="020B0609020204030204" pitchFamily="49" charset="0"/>
               </a:rPr>
               <a:t> </a:t>
             </a:r>
             <a:r>
-              <a:rPr lang="en-US" sz="1700" b="1" dirty="0" err="1">
+              <a:rPr lang="en-US" sz="1800" b="1" dirty="0" err="1">
                 <a:latin typeface="Consolas" panose="020B0609020204030204" pitchFamily="49" charset="0"/>
               </a:rPr>
               <a:t>instanceof</a:t>
             </a:r>
             <a:r>
-              <a:rPr lang="en-US" sz="1700" b="1" dirty="0">
+              <a:rPr lang="en-US" sz="1800" b="1" dirty="0">
                 <a:latin typeface="Consolas" panose="020B0609020204030204" pitchFamily="49" charset="0"/>
               </a:rPr>
               <a:t> </a:t>
             </a:r>
             <a:r>
-              <a:rPr lang="en-US" sz="1700" b="1" dirty="0" err="1">
+              <a:rPr lang="en-US" sz="1800" b="1" dirty="0" err="1">
                 <a:latin typeface="Consolas" panose="020B0609020204030204" pitchFamily="49" charset="0"/>
               </a:rPr>
               <a:t>VariableDecl</a:t>
             </a:r>
             <a:r>
-              <a:rPr lang="en-US" sz="1700" dirty="0">
+              <a:rPr lang="en-US" sz="1800" dirty="0">
                 <a:latin typeface="Consolas" panose="020B0609020204030204" pitchFamily="49" charset="0"/>
               </a:rPr>
               <a:t>))</a:t>
             </a:r>
           </a:p>
           <a:p>
-            <a:pPr marL="457200" lvl="1" indent="0">
-              <a:spcBef>
-                <a:spcPts val="200"/>
-              </a:spcBef>
-              <a:buNone/>
-            </a:pPr>
-            <a:r>
-              <a:rPr lang="en-US" sz="1700" dirty="0">
+            <a:pPr marL="182880" lvl="1" indent="0">
+              <a:spcBef>
+                <a:spcPts val="100"/>
+              </a:spcBef>
+              <a:buNone/>
+            </a:pPr>
+            <a:r>
+              <a:rPr lang="en-US" sz="1800" dirty="0">
                 <a:latin typeface="Consolas" panose="020B0609020204030204" pitchFamily="49" charset="0"/>
               </a:rPr>
               <a:t>  {</a:t>
             </a:r>
           </a:p>
           <a:p>
-            <a:pPr marL="457200" lvl="1" indent="0">
-              <a:spcBef>
-                <a:spcPts val="200"/>
-              </a:spcBef>
-              <a:buNone/>
-            </a:pPr>
-            <a:r>
-              <a:rPr lang="en-US" sz="1700" dirty="0">
-                <a:latin typeface="Consolas" panose="020B0609020204030204" pitchFamily="49" charset="0"/>
-              </a:rPr>
-              <a:t>    String </a:t>
-            </a:r>
-            <a:r>
-              <a:rPr lang="en-US" sz="1700" dirty="0" err="1">
+            <a:pPr marL="182880" lvl="1" indent="0">
+              <a:spcBef>
+                <a:spcPts val="100"/>
+              </a:spcBef>
+              <a:buNone/>
+            </a:pPr>
+            <a:r>
+              <a:rPr lang="en-US" sz="1800" dirty="0">
+                <a:latin typeface="Consolas" panose="020B0609020204030204" pitchFamily="49" charset="0"/>
+              </a:rPr>
+              <a:t>    var </a:t>
+            </a:r>
+            <a:r>
+              <a:rPr lang="en-US" sz="1800" dirty="0" err="1">
                 <a:latin typeface="Consolas" panose="020B0609020204030204" pitchFamily="49" charset="0"/>
               </a:rPr>
               <a:t>errorMsg</a:t>
             </a:r>
             <a:r>
-              <a:rPr lang="en-US" sz="1700" dirty="0">
+              <a:rPr lang="en-US" sz="1800" dirty="0">
                 <a:latin typeface="Consolas" panose="020B0609020204030204" pitchFamily="49" charset="0"/>
               </a:rPr>
               <a:t> = "Identifier \"" + </a:t>
             </a:r>
             <a:r>
-              <a:rPr lang="en-US" sz="1700" dirty="0" err="1">
+              <a:rPr lang="en-US" sz="1800" dirty="0" err="1">
                 <a:latin typeface="Consolas" panose="020B0609020204030204" pitchFamily="49" charset="0"/>
               </a:rPr>
               <a:t>idToken</a:t>
             </a:r>
-            <a:endParaRPr lang="en-US" sz="1700" dirty="0">
+            <a:endParaRPr lang="en-US" sz="1800" dirty="0">
               <a:latin typeface="Consolas" panose="020B0609020204030204" pitchFamily="49" charset="0"/>
             </a:endParaRPr>
           </a:p>
           <a:p>
-            <a:pPr marL="457200" lvl="1" indent="0">
-              <a:spcBef>
-                <a:spcPts val="200"/>
-              </a:spcBef>
-              <a:buNone/>
-            </a:pPr>
-            <a:r>
-              <a:rPr lang="en-US" sz="1700" dirty="0">
-                <a:latin typeface="Consolas" panose="020B0609020204030204" pitchFamily="49" charset="0"/>
-              </a:rPr>
-              <a:t>                    + "\" is not a variable.";</a:t>
-            </a:r>
-          </a:p>
-          <a:p>
-            <a:pPr marL="457200" lvl="1" indent="0">
-              <a:spcBef>
-                <a:spcPts val="200"/>
-              </a:spcBef>
-              <a:buNone/>
-            </a:pPr>
-            <a:r>
-              <a:rPr lang="en-US" sz="1700" dirty="0">
+            <a:pPr marL="182880" lvl="1" indent="0">
+              <a:spcBef>
+                <a:spcPts val="100"/>
+              </a:spcBef>
+              <a:buNone/>
+            </a:pPr>
+            <a:r>
+              <a:rPr lang="en-US" sz="1800" dirty="0">
+                <a:latin typeface="Consolas" panose="020B0609020204030204" pitchFamily="49" charset="0"/>
+              </a:rPr>
+              <a:t>                 + "\" is not a variable.";</a:t>
+            </a:r>
+          </a:p>
+          <a:p>
+            <a:pPr marL="182880" lvl="1" indent="0">
+              <a:spcBef>
+                <a:spcPts val="100"/>
+              </a:spcBef>
+              <a:buNone/>
+            </a:pPr>
+            <a:r>
+              <a:rPr lang="en-US" sz="1800" dirty="0">
                 <a:latin typeface="Consolas" panose="020B0609020204030204" pitchFamily="49" charset="0"/>
               </a:rPr>
               <a:t>    throw error(</a:t>
             </a:r>
             <a:r>
-              <a:rPr lang="en-US" sz="1700" dirty="0" err="1">
+              <a:rPr lang="en-US" sz="1800" dirty="0" err="1">
                 <a:latin typeface="Consolas" panose="020B0609020204030204" pitchFamily="49" charset="0"/>
               </a:rPr>
               <a:t>idToken.getPosition</a:t>
             </a:r>
             <a:r>
-              <a:rPr lang="en-US" sz="1700" dirty="0">
+              <a:rPr lang="en-US" sz="1800" dirty="0">
                 <a:latin typeface="Consolas" panose="020B0609020204030204" pitchFamily="49" charset="0"/>
               </a:rPr>
               <a:t>(), </a:t>
             </a:r>
             <a:r>
-              <a:rPr lang="en-US" sz="1700" dirty="0" err="1">
+              <a:rPr lang="en-US" sz="1800" dirty="0" err="1">
                 <a:latin typeface="Consolas" panose="020B0609020204030204" pitchFamily="49" charset="0"/>
               </a:rPr>
               <a:t>errorMsg</a:t>
             </a:r>
             <a:r>
-              <a:rPr lang="en-US" sz="1700" dirty="0">
+              <a:rPr lang="en-US" sz="1800" dirty="0">
                 <a:latin typeface="Consolas" panose="020B0609020204030204" pitchFamily="49" charset="0"/>
               </a:rPr>
               <a:t>);</a:t>
             </a:r>
           </a:p>
           <a:p>
-            <a:pPr marL="457200" lvl="1" indent="0">
-              <a:spcBef>
-                <a:spcPts val="200"/>
-              </a:spcBef>
-              <a:buNone/>
-            </a:pPr>
-            <a:r>
-              <a:rPr lang="en-US" sz="1700" dirty="0">
+            <a:pPr marL="182880" lvl="1" indent="0">
+              <a:spcBef>
+                <a:spcPts val="100"/>
+              </a:spcBef>
+              <a:buNone/>
+            </a:pPr>
+            <a:r>
+              <a:rPr lang="en-US" sz="1800" dirty="0">
                 <a:latin typeface="Consolas" panose="020B0609020204030204" pitchFamily="49" charset="0"/>
               </a:rPr>
               <a:t>  }</a:t>
@@ -19480,7 +19515,7 @@
               <a:rPr lang="en-US" sz="1800" dirty="0">
                 <a:latin typeface="Consolas" pitchFamily="49" charset="0"/>
               </a:rPr>
-              <a:t>        Token constId = scanner.getToken();</a:t>
+              <a:t>        var constId = scanner.getToken();</a:t>
             </a:r>
           </a:p>
           <a:p>
@@ -19929,7 +19964,19 @@
               <a:rPr lang="en-US" sz="1800" dirty="0" err="1">
                 <a:latin typeface="Consolas" pitchFamily="49" charset="0"/>
               </a:rPr>
-              <a:t>errorHandler.reportError</a:t>
+              <a:t>errorHandler</a:t>
+            </a:r>
+            <a:r>
+              <a:rPr lang="en-US" sz="1800" dirty="0">
+                <a:latin typeface="Consolas" pitchFamily="49" charset="0"/>
+              </a:rPr>
+              <a:t>..</a:t>
+            </a:r>
+            <a:r>
+              <a:rPr lang="en-US" sz="1800" dirty="0" err="1">
+                <a:latin typeface="Consolas" pitchFamily="49" charset="0"/>
+              </a:rPr>
+              <a:t>reportError</a:t>
             </a:r>
             <a:r>
               <a:rPr lang="en-US" sz="1800" dirty="0">
@@ -21834,7 +21881,7 @@
         </p:nvSpPr>
         <p:spPr>
           <a:xfrm>
-            <a:off x="2075868" y="3657600"/>
+            <a:off x="2075868" y="3790890"/>
             <a:ext cx="4992264" cy="400110"/>
           </a:xfrm>
           <a:prstGeom prst="rect">
@@ -25775,19 +25822,19 @@
               <a:buNone/>
             </a:pPr>
             <a:r>
-              <a:rPr lang="en-US" dirty="0">
+              <a:rPr lang="en-US" sz="1800" dirty="0">
                 <a:latin typeface="Consolas" panose="020B0609020204030204" pitchFamily="49" charset="0"/>
               </a:rPr>
               <a:t>type </a:t>
             </a:r>
             <a:r>
-              <a:rPr lang="en-US" dirty="0" err="1">
+              <a:rPr lang="en-US" sz="1800" dirty="0" err="1">
                 <a:latin typeface="Consolas" panose="020B0609020204030204" pitchFamily="49" charset="0"/>
               </a:rPr>
               <a:t>MonthName</a:t>
             </a:r>
             <a:r>
-              <a:rPr lang="en-US" dirty="0">
+              <a:rPr lang="en-US" sz="1800" dirty="0">
                 <a:latin typeface="Consolas" panose="020B0609020204030204" pitchFamily="49" charset="0"/>
               </a:rPr>
               <a:t> = string[9];</a:t>
@@ -25795,10 +25842,13 @@
           </a:p>
           <a:p>
             <a:pPr marL="457200" lvl="1" indent="0">
-              <a:buNone/>
-            </a:pPr>
-            <a:r>
-              <a:rPr lang="en-US" dirty="0">
+              <a:spcBef>
+                <a:spcPts val="300"/>
+              </a:spcBef>
+              <a:buNone/>
+            </a:pPr>
+            <a:r>
+              <a:rPr lang="en-US" sz="1800" dirty="0">
                 <a:latin typeface="Consolas" panose="020B0609020204030204" pitchFamily="49" charset="0"/>
               </a:rPr>
               <a:t>type Month = record</a:t>
@@ -25806,10 +25856,13 @@
           </a:p>
           <a:p>
             <a:pPr marL="457200" lvl="1" indent="0">
-              <a:buNone/>
-            </a:pPr>
-            <a:r>
-              <a:rPr lang="en-US" dirty="0">
+              <a:spcBef>
+                <a:spcPts val="300"/>
+              </a:spcBef>
+              <a:buNone/>
+            </a:pPr>
+            <a:r>
+              <a:rPr lang="en-US" sz="1800" dirty="0">
                 <a:latin typeface="Consolas" panose="020B0609020204030204" pitchFamily="49" charset="0"/>
               </a:rPr>
               <a:t>  {</a:t>
@@ -25817,22 +25870,25 @@
           </a:p>
           <a:p>
             <a:pPr marL="457200" lvl="1" indent="0">
-              <a:buNone/>
-            </a:pPr>
-            <a:r>
-              <a:rPr lang="en-US" dirty="0">
+              <a:spcBef>
+                <a:spcPts val="300"/>
+              </a:spcBef>
+              <a:buNone/>
+            </a:pPr>
+            <a:r>
+              <a:rPr lang="en-US" sz="1800" dirty="0">
                 <a:latin typeface="Consolas" panose="020B0609020204030204" pitchFamily="49" charset="0"/>
               </a:rPr>
               <a:t>    name    : </a:t>
             </a:r>
             <a:r>
-              <a:rPr lang="en-US" dirty="0" err="1">
+              <a:rPr lang="en-US" sz="1800" dirty="0" err="1">
                 <a:latin typeface="Consolas" panose="020B0609020204030204" pitchFamily="49" charset="0"/>
               </a:rPr>
               <a:t>MonthName</a:t>
             </a:r>
             <a:r>
-              <a:rPr lang="en-US" dirty="0">
+              <a:rPr lang="en-US" sz="1800" dirty="0">
                 <a:latin typeface="Consolas" panose="020B0609020204030204" pitchFamily="49" charset="0"/>
               </a:rPr>
               <a:t>;</a:t>
@@ -25840,22 +25896,25 @@
           </a:p>
           <a:p>
             <a:pPr marL="457200" lvl="1" indent="0">
-              <a:buNone/>
-            </a:pPr>
-            <a:r>
-              <a:rPr lang="en-US" dirty="0">
+              <a:spcBef>
+                <a:spcPts val="300"/>
+              </a:spcBef>
+              <a:buNone/>
+            </a:pPr>
+            <a:r>
+              <a:rPr lang="en-US" sz="1800" dirty="0">
                 <a:latin typeface="Consolas" panose="020B0609020204030204" pitchFamily="49" charset="0"/>
               </a:rPr>
               <a:t>    </a:t>
             </a:r>
             <a:r>
-              <a:rPr lang="en-US" dirty="0" err="1">
+              <a:rPr lang="en-US" sz="1800" dirty="0" err="1">
                 <a:latin typeface="Consolas" panose="020B0609020204030204" pitchFamily="49" charset="0"/>
               </a:rPr>
               <a:t>maxDays</a:t>
             </a:r>
             <a:r>
-              <a:rPr lang="en-US" dirty="0">
+              <a:rPr lang="en-US" sz="1800" dirty="0">
                 <a:latin typeface="Consolas" panose="020B0609020204030204" pitchFamily="49" charset="0"/>
               </a:rPr>
               <a:t> : Integer;</a:t>
@@ -25863,10 +25922,13 @@
           </a:p>
           <a:p>
             <a:pPr marL="457200" lvl="1" indent="0">
-              <a:buNone/>
-            </a:pPr>
-            <a:r>
-              <a:rPr lang="en-US" dirty="0">
+              <a:spcBef>
+                <a:spcPts val="300"/>
+              </a:spcBef>
+              <a:buNone/>
+            </a:pPr>
+            <a:r>
+              <a:rPr lang="en-US" sz="1800" dirty="0">
                 <a:latin typeface="Consolas" panose="020B0609020204030204" pitchFamily="49" charset="0"/>
               </a:rPr>
               <a:t>  };</a:t>
@@ -25874,10 +25936,13 @@
           </a:p>
           <a:p>
             <a:pPr marL="457200" lvl="1" indent="0">
-              <a:buNone/>
-            </a:pPr>
-            <a:r>
-              <a:rPr lang="en-US" dirty="0">
+              <a:spcBef>
+                <a:spcPts val="300"/>
+              </a:spcBef>
+              <a:buNone/>
+            </a:pPr>
+            <a:r>
+              <a:rPr lang="en-US" sz="1800" dirty="0">
                 <a:latin typeface="Consolas" panose="020B0609020204030204" pitchFamily="49" charset="0"/>
               </a:rPr>
               <a:t>type Months = array[13] of Month;   // 1 for "January"</a:t>
@@ -25885,10 +25950,13 @@
           </a:p>
           <a:p>
             <a:pPr marL="457200" lvl="1" indent="0">
-              <a:buNone/>
-            </a:pPr>
-            <a:r>
-              <a:rPr lang="en-US" dirty="0">
+              <a:spcBef>
+                <a:spcPts val="300"/>
+              </a:spcBef>
+              <a:buNone/>
+            </a:pPr>
+            <a:r>
+              <a:rPr lang="en-US" sz="1800" dirty="0">
                 <a:latin typeface="Consolas" panose="020B0609020204030204" pitchFamily="49" charset="0"/>
               </a:rPr>
               <a:t>var  months : Months;</a:t>
@@ -26375,244 +26443,244 @@
             </a:r>
           </a:p>
           <a:p>
-            <a:pPr marL="457200" lvl="1" indent="0">
-              <a:buNone/>
-            </a:pPr>
-            <a:r>
-              <a:rPr lang="en-US" sz="1750" dirty="0">
+            <a:pPr marL="438912" lvl="1" indent="0">
+              <a:buNone/>
+            </a:pPr>
+            <a:r>
+              <a:rPr lang="en-US" sz="1800" dirty="0">
                 <a:latin typeface="Consolas" panose="020B0609020204030204" pitchFamily="49" charset="0"/>
               </a:rPr>
               <a:t>for (Expression expr : </a:t>
             </a:r>
             <a:r>
-              <a:rPr lang="en-US" sz="1750" dirty="0" err="1">
+              <a:rPr lang="en-US" sz="1800" dirty="0" err="1">
                 <a:latin typeface="Consolas" panose="020B0609020204030204" pitchFamily="49" charset="0"/>
               </a:rPr>
               <a:t>selectorExprs</a:t>
             </a:r>
             <a:r>
-              <a:rPr lang="en-US" sz="1750" dirty="0">
+              <a:rPr lang="en-US" sz="1800" dirty="0">
                 <a:latin typeface="Consolas" panose="020B0609020204030204" pitchFamily="49" charset="0"/>
               </a:rPr>
               <a:t>)</a:t>
             </a:r>
           </a:p>
           <a:p>
-            <a:pPr marL="457200" lvl="1" indent="0">
+            <a:pPr marL="438912" lvl="1" indent="0">
               <a:spcBef>
                 <a:spcPts val="100"/>
               </a:spcBef>
               <a:buNone/>
             </a:pPr>
             <a:r>
-              <a:rPr lang="en-US" sz="1750" dirty="0">
+              <a:rPr lang="en-US" sz="1800" dirty="0">
                 <a:latin typeface="Consolas" panose="020B0609020204030204" pitchFamily="49" charset="0"/>
               </a:rPr>
               <a:t>  {</a:t>
             </a:r>
           </a:p>
           <a:p>
-            <a:pPr marL="457200" lvl="1" indent="0">
+            <a:pPr marL="438912" lvl="1" indent="0">
               <a:spcBef>
                 <a:spcPts val="100"/>
               </a:spcBef>
               <a:buNone/>
             </a:pPr>
             <a:r>
-              <a:rPr lang="en-US" sz="1750" dirty="0">
+              <a:rPr lang="en-US" sz="1800" dirty="0">
                 <a:latin typeface="Consolas" panose="020B0609020204030204" pitchFamily="49" charset="0"/>
               </a:rPr>
               <a:t>    </a:t>
             </a:r>
             <a:r>
-              <a:rPr lang="en-US" sz="1750" dirty="0" err="1">
+              <a:rPr lang="en-US" sz="1800" dirty="0" err="1">
                 <a:latin typeface="Consolas" panose="020B0609020204030204" pitchFamily="49" charset="0"/>
               </a:rPr>
               <a:t>expr.checkConstraints</a:t>
             </a:r>
             <a:r>
-              <a:rPr lang="en-US" sz="1750" dirty="0">
+              <a:rPr lang="en-US" sz="1800" dirty="0">
                 <a:latin typeface="Consolas" panose="020B0609020204030204" pitchFamily="49" charset="0"/>
               </a:rPr>
               <a:t>();</a:t>
             </a:r>
           </a:p>
           <a:p>
-            <a:pPr marL="457200" lvl="1" indent="0">
+            <a:pPr marL="438912" lvl="1" indent="0">
               <a:spcBef>
                 <a:spcPts val="100"/>
               </a:spcBef>
               <a:buNone/>
             </a:pPr>
-            <a:endParaRPr lang="en-US" sz="1750" dirty="0">
+            <a:endParaRPr lang="en-US" sz="1800" dirty="0">
               <a:latin typeface="Consolas" panose="020B0609020204030204" pitchFamily="49" charset="0"/>
             </a:endParaRPr>
           </a:p>
           <a:p>
-            <a:pPr marL="457200" lvl="1" indent="0">
+            <a:pPr marL="438912" lvl="1" indent="0">
               <a:spcBef>
                 <a:spcPts val="100"/>
               </a:spcBef>
               <a:buNone/>
             </a:pPr>
             <a:r>
-              <a:rPr lang="en-US" sz="1750" dirty="0">
+              <a:rPr lang="en-US" sz="1800" dirty="0">
                 <a:latin typeface="Consolas" panose="020B0609020204030204" pitchFamily="49" charset="0"/>
               </a:rPr>
               <a:t>    if (</a:t>
             </a:r>
             <a:r>
-              <a:rPr lang="en-US" sz="1750" dirty="0" err="1">
+              <a:rPr lang="en-US" sz="1800" dirty="0" err="1">
                 <a:latin typeface="Consolas" panose="020B0609020204030204" pitchFamily="49" charset="0"/>
               </a:rPr>
               <a:t>getType</a:t>
             </a:r>
             <a:r>
-              <a:rPr lang="en-US" sz="1750" dirty="0">
+              <a:rPr lang="en-US" sz="1800" dirty="0">
                 <a:latin typeface="Consolas" panose="020B0609020204030204" pitchFamily="49" charset="0"/>
               </a:rPr>
               <a:t>() </a:t>
             </a:r>
             <a:r>
-              <a:rPr lang="en-US" sz="1750" dirty="0" err="1">
+              <a:rPr lang="en-US" sz="1800" dirty="0" err="1">
                 <a:latin typeface="Consolas" panose="020B0609020204030204" pitchFamily="49" charset="0"/>
               </a:rPr>
               <a:t>instanceof</a:t>
             </a:r>
             <a:r>
-              <a:rPr lang="en-US" sz="1750" dirty="0">
+              <a:rPr lang="en-US" sz="1800" dirty="0">
                 <a:latin typeface="Consolas" panose="020B0609020204030204" pitchFamily="49" charset="0"/>
               </a:rPr>
               <a:t> </a:t>
             </a:r>
             <a:r>
-              <a:rPr lang="en-US" sz="1750" dirty="0" err="1">
+              <a:rPr lang="en-US" sz="1800" dirty="0" err="1">
                 <a:latin typeface="Consolas" panose="020B0609020204030204" pitchFamily="49" charset="0"/>
               </a:rPr>
               <a:t>ArrayType</a:t>
             </a:r>
             <a:r>
-              <a:rPr lang="en-US" sz="1750" dirty="0">
+              <a:rPr lang="en-US" sz="1800" dirty="0">
                 <a:latin typeface="Consolas" panose="020B0609020204030204" pitchFamily="49" charset="0"/>
               </a:rPr>
               <a:t> </a:t>
             </a:r>
             <a:r>
-              <a:rPr lang="en-US" sz="1750" dirty="0" err="1">
+              <a:rPr lang="en-US" sz="1800" dirty="0" err="1">
                 <a:latin typeface="Consolas" panose="020B0609020204030204" pitchFamily="49" charset="0"/>
               </a:rPr>
               <a:t>arrayType</a:t>
             </a:r>
             <a:r>
-              <a:rPr lang="en-US" sz="1750" dirty="0">
+              <a:rPr lang="en-US" sz="1800" dirty="0">
                 <a:latin typeface="Consolas" panose="020B0609020204030204" pitchFamily="49" charset="0"/>
               </a:rPr>
               <a:t>)</a:t>
             </a:r>
           </a:p>
           <a:p>
-            <a:pPr marL="457200" lvl="1" indent="0">
+            <a:pPr marL="438912" lvl="1" indent="0">
               <a:spcBef>
                 <a:spcPts val="100"/>
               </a:spcBef>
               <a:buNone/>
             </a:pPr>
             <a:r>
-              <a:rPr lang="en-US" sz="1750" dirty="0">
+              <a:rPr lang="en-US" sz="1800" dirty="0">
                 <a:latin typeface="Consolas" panose="020B0609020204030204" pitchFamily="49" charset="0"/>
               </a:rPr>
               <a:t>      {</a:t>
             </a:r>
           </a:p>
           <a:p>
-            <a:pPr marL="457200" lvl="1" indent="0">
+            <a:pPr marL="438912" lvl="1" indent="0">
               <a:spcBef>
                 <a:spcPts val="100"/>
               </a:spcBef>
               <a:buNone/>
             </a:pPr>
             <a:r>
-              <a:rPr lang="en-US" sz="1750" dirty="0">
+              <a:rPr lang="en-US" sz="1800" dirty="0">
                 <a:latin typeface="Consolas" panose="020B0609020204030204" pitchFamily="49" charset="0"/>
               </a:rPr>
               <a:t>        // Applying the selector effectively changes the</a:t>
             </a:r>
           </a:p>
           <a:p>
-            <a:pPr marL="457200" lvl="1" indent="0">
+            <a:pPr marL="438912" lvl="1" indent="0">
               <a:spcBef>
                 <a:spcPts val="100"/>
               </a:spcBef>
               <a:buNone/>
             </a:pPr>
             <a:r>
-              <a:rPr lang="en-US" sz="1750" dirty="0">
+              <a:rPr lang="en-US" sz="1800" dirty="0">
                 <a:latin typeface="Consolas" panose="020B0609020204030204" pitchFamily="49" charset="0"/>
               </a:rPr>
               <a:t>        // variable's type to the element type of the array.</a:t>
             </a:r>
           </a:p>
           <a:p>
-            <a:pPr marL="457200" lvl="1" indent="0">
+            <a:pPr marL="438912" lvl="1" indent="0">
               <a:spcBef>
                 <a:spcPts val="100"/>
               </a:spcBef>
               <a:buNone/>
             </a:pPr>
             <a:r>
-              <a:rPr lang="en-US" sz="1750" dirty="0">
+              <a:rPr lang="en-US" sz="1800" dirty="0">
                 <a:latin typeface="Consolas" panose="020B0609020204030204" pitchFamily="49" charset="0"/>
               </a:rPr>
               <a:t>        </a:t>
             </a:r>
             <a:r>
-              <a:rPr lang="en-US" sz="1750" dirty="0" err="1">
+              <a:rPr lang="en-US" sz="1800" dirty="0" err="1">
                 <a:latin typeface="Consolas" panose="020B0609020204030204" pitchFamily="49" charset="0"/>
               </a:rPr>
               <a:t>setType</a:t>
             </a:r>
             <a:r>
-              <a:rPr lang="en-US" sz="1750" dirty="0">
+              <a:rPr lang="en-US" sz="1800" dirty="0">
                 <a:latin typeface="Consolas" panose="020B0609020204030204" pitchFamily="49" charset="0"/>
               </a:rPr>
               <a:t>(</a:t>
             </a:r>
             <a:r>
-              <a:rPr lang="en-US" sz="1750" dirty="0" err="1">
+              <a:rPr lang="en-US" sz="1800" dirty="0" err="1">
                 <a:latin typeface="Consolas" panose="020B0609020204030204" pitchFamily="49" charset="0"/>
               </a:rPr>
               <a:t>arrayType.getElementType</a:t>
             </a:r>
             <a:r>
-              <a:rPr lang="en-US" sz="1750" dirty="0">
+              <a:rPr lang="en-US" sz="1800" dirty="0">
                 <a:latin typeface="Consolas" panose="020B0609020204030204" pitchFamily="49" charset="0"/>
               </a:rPr>
               <a:t>());</a:t>
             </a:r>
           </a:p>
           <a:p>
-            <a:pPr marL="457200" lvl="1" indent="0">
+            <a:pPr marL="438912" lvl="1" indent="0">
               <a:spcBef>
                 <a:spcPts val="100"/>
               </a:spcBef>
               <a:buNone/>
             </a:pPr>
             <a:r>
-              <a:rPr lang="en-US" sz="1750" dirty="0">
+              <a:rPr lang="en-US" sz="1800" dirty="0">
                 <a:latin typeface="Consolas" panose="020B0609020204030204" pitchFamily="49" charset="0"/>
               </a:rPr>
               <a:t>        ...</a:t>
             </a:r>
           </a:p>
           <a:p>
-            <a:pPr marL="457200" lvl="1" indent="0">
+            <a:pPr marL="438912" lvl="1" indent="0">
               <a:spcBef>
                 <a:spcPts val="100"/>
               </a:spcBef>
               <a:buNone/>
             </a:pPr>
             <a:r>
-              <a:rPr lang="en-US" sz="1750" dirty="0">
+              <a:rPr lang="en-US" sz="1800" dirty="0">
                 <a:latin typeface="Consolas" panose="020B0609020204030204" pitchFamily="49" charset="0"/>
               </a:rPr>
               <a:t>      }</a:t>
@@ -26737,7 +26805,7 @@
     </p:spTree>
     <p:extLst>
       <p:ext uri="{BB962C8B-B14F-4D97-AF65-F5344CB8AC3E}">
-        <p14:creationId xmlns:p14="http://schemas.microsoft.com/office/powerpoint/2010/main" val="3561724483"/>
+        <p14:creationId xmlns:p14="http://schemas.microsoft.com/office/powerpoint/2010/main" val="3760471126"/>
       </p:ext>
     </p:extLst>
   </p:cSld>
@@ -26821,376 +26889,381 @@
             <p:ph idx="1"/>
           </p:nvPr>
         </p:nvSpPr>
-        <p:spPr/>
+        <p:spPr>
+          <a:xfrm>
+            <a:off x="458787" y="1363663"/>
+            <a:ext cx="8321040" cy="4935537"/>
+          </a:xfrm>
+        </p:spPr>
         <p:txBody>
           <a:bodyPr/>
           <a:lstStyle/>
           <a:p>
-            <a:pPr marL="457200" lvl="1" indent="0">
+            <a:pPr marL="438912" lvl="1" indent="0">
               <a:spcBef>
                 <a:spcPts val="100"/>
               </a:spcBef>
               <a:buNone/>
             </a:pPr>
             <a:r>
-              <a:rPr lang="en-US" sz="1750" dirty="0">
+              <a:rPr lang="en-US" sz="1800" dirty="0">
                 <a:latin typeface="Consolas" panose="020B0609020204030204" pitchFamily="49" charset="0"/>
               </a:rPr>
               <a:t>    else if (</a:t>
             </a:r>
             <a:r>
-              <a:rPr lang="en-US" sz="1750" dirty="0" err="1">
+              <a:rPr lang="en-US" sz="1800" dirty="0" err="1">
                 <a:latin typeface="Consolas" panose="020B0609020204030204" pitchFamily="49" charset="0"/>
               </a:rPr>
               <a:t>getType</a:t>
             </a:r>
             <a:r>
-              <a:rPr lang="en-US" sz="1750" dirty="0">
+              <a:rPr lang="en-US" sz="1800" dirty="0">
                 <a:latin typeface="Consolas" panose="020B0609020204030204" pitchFamily="49" charset="0"/>
               </a:rPr>
               <a:t>() </a:t>
             </a:r>
             <a:r>
-              <a:rPr lang="en-US" sz="1750" dirty="0" err="1">
+              <a:rPr lang="en-US" sz="1800" dirty="0" err="1">
                 <a:latin typeface="Consolas" panose="020B0609020204030204" pitchFamily="49" charset="0"/>
               </a:rPr>
               <a:t>instanceof</a:t>
             </a:r>
             <a:r>
-              <a:rPr lang="en-US" sz="1750" dirty="0">
+              <a:rPr lang="en-US" sz="1800" dirty="0">
                 <a:latin typeface="Consolas" panose="020B0609020204030204" pitchFamily="49" charset="0"/>
               </a:rPr>
               <a:t> </a:t>
             </a:r>
             <a:r>
-              <a:rPr lang="en-US" sz="1750" dirty="0" err="1">
+              <a:rPr lang="en-US" sz="1800" dirty="0" err="1">
                 <a:latin typeface="Consolas" panose="020B0609020204030204" pitchFamily="49" charset="0"/>
               </a:rPr>
               <a:t>RecordType</a:t>
             </a:r>
             <a:r>
-              <a:rPr lang="en-US" sz="1750" dirty="0">
+              <a:rPr lang="en-US" sz="1800" dirty="0">
                 <a:latin typeface="Consolas" panose="020B0609020204030204" pitchFamily="49" charset="0"/>
               </a:rPr>
               <a:t> </a:t>
             </a:r>
             <a:r>
-              <a:rPr lang="en-US" sz="1750" dirty="0" err="1">
+              <a:rPr lang="en-US" sz="1800" dirty="0" err="1">
                 <a:latin typeface="Consolas" panose="020B0609020204030204" pitchFamily="49" charset="0"/>
               </a:rPr>
               <a:t>recType</a:t>
             </a:r>
             <a:r>
-              <a:rPr lang="en-US" sz="1750" dirty="0">
+              <a:rPr lang="en-US" sz="1800" dirty="0">
                 <a:latin typeface="Consolas" panose="020B0609020204030204" pitchFamily="49" charset="0"/>
               </a:rPr>
               <a:t>)</a:t>
             </a:r>
           </a:p>
           <a:p>
-            <a:pPr marL="457200" lvl="1" indent="0">
+            <a:pPr marL="438912" lvl="1" indent="0">
               <a:spcBef>
                 <a:spcPts val="100"/>
               </a:spcBef>
               <a:buNone/>
             </a:pPr>
             <a:r>
-              <a:rPr lang="en-US" sz="1750" dirty="0">
+              <a:rPr lang="en-US" sz="1800" dirty="0">
                 <a:latin typeface="Consolas" panose="020B0609020204030204" pitchFamily="49" charset="0"/>
               </a:rPr>
               <a:t>      {</a:t>
             </a:r>
           </a:p>
           <a:p>
-            <a:pPr marL="457200" lvl="1" indent="0">
+            <a:pPr marL="438912" lvl="1" indent="0">
               <a:spcBef>
                 <a:spcPts val="100"/>
               </a:spcBef>
               <a:buNone/>
             </a:pPr>
             <a:r>
-              <a:rPr lang="en-US" sz="1750" dirty="0">
+              <a:rPr lang="en-US" sz="1800" dirty="0">
                 <a:latin typeface="Consolas" panose="020B0609020204030204" pitchFamily="49" charset="0"/>
               </a:rPr>
               <a:t>        // change type to the type of the field</a:t>
             </a:r>
           </a:p>
           <a:p>
-            <a:pPr marL="457200" lvl="1" indent="0">
+            <a:pPr marL="438912" lvl="1" indent="0">
               <a:spcBef>
                 <a:spcPts val="100"/>
               </a:spcBef>
               <a:buNone/>
             </a:pPr>
             <a:r>
-              <a:rPr lang="en-US" sz="1750" dirty="0">
+              <a:rPr lang="en-US" sz="1800" dirty="0">
                 <a:latin typeface="Consolas" panose="020B0609020204030204" pitchFamily="49" charset="0"/>
               </a:rPr>
               <a:t>        ...</a:t>
             </a:r>
           </a:p>
           <a:p>
-            <a:pPr marL="457200" lvl="1" indent="0">
+            <a:pPr marL="438912" lvl="1" indent="0">
               <a:spcBef>
                 <a:spcPts val="100"/>
               </a:spcBef>
               <a:buNone/>
             </a:pPr>
             <a:r>
-              <a:rPr lang="en-US" sz="1750" dirty="0">
+              <a:rPr lang="en-US" sz="1800" dirty="0">
                 <a:latin typeface="Consolas" panose="020B0609020204030204" pitchFamily="49" charset="0"/>
               </a:rPr>
               <a:t>      }</a:t>
             </a:r>
           </a:p>
           <a:p>
-            <a:pPr marL="457200" lvl="1" indent="0">
+            <a:pPr marL="438912" lvl="1" indent="0">
               <a:spcBef>
                 <a:spcPts val="100"/>
               </a:spcBef>
               <a:buNone/>
             </a:pPr>
             <a:r>
-              <a:rPr lang="en-US" sz="1750" dirty="0">
+              <a:rPr lang="en-US" sz="1800" dirty="0">
                 <a:latin typeface="Consolas" panose="020B0609020204030204" pitchFamily="49" charset="0"/>
               </a:rPr>
               <a:t>    else if (</a:t>
             </a:r>
             <a:r>
-              <a:rPr lang="en-US" sz="1750" dirty="0" err="1">
+              <a:rPr lang="en-US" sz="1800" dirty="0" err="1">
                 <a:latin typeface="Consolas" panose="020B0609020204030204" pitchFamily="49" charset="0"/>
               </a:rPr>
               <a:t>getType</a:t>
             </a:r>
             <a:r>
-              <a:rPr lang="en-US" sz="1750" dirty="0">
+              <a:rPr lang="en-US" sz="1800" dirty="0">
                 <a:latin typeface="Consolas" panose="020B0609020204030204" pitchFamily="49" charset="0"/>
               </a:rPr>
               <a:t>() </a:t>
             </a:r>
             <a:r>
-              <a:rPr lang="en-US" sz="1750" dirty="0" err="1">
+              <a:rPr lang="en-US" sz="1800" dirty="0" err="1">
                 <a:latin typeface="Consolas" panose="020B0609020204030204" pitchFamily="49" charset="0"/>
               </a:rPr>
               <a:t>instanceof</a:t>
             </a:r>
             <a:r>
-              <a:rPr lang="en-US" sz="1750" dirty="0">
+              <a:rPr lang="en-US" sz="1800" dirty="0">
                 <a:latin typeface="Consolas" panose="020B0609020204030204" pitchFamily="49" charset="0"/>
               </a:rPr>
               <a:t> </a:t>
             </a:r>
             <a:r>
-              <a:rPr lang="en-US" sz="1750" dirty="0" err="1">
+              <a:rPr lang="en-US" sz="1800" dirty="0" err="1">
                 <a:latin typeface="Consolas" panose="020B0609020204030204" pitchFamily="49" charset="0"/>
               </a:rPr>
               <a:t>StringType</a:t>
             </a:r>
             <a:r>
-              <a:rPr lang="en-US" sz="1750" dirty="0">
+              <a:rPr lang="en-US" sz="1800" dirty="0">
                 <a:latin typeface="Consolas" panose="020B0609020204030204" pitchFamily="49" charset="0"/>
               </a:rPr>
               <a:t>)</a:t>
             </a:r>
           </a:p>
           <a:p>
-            <a:pPr marL="457200" lvl="1" indent="0">
+            <a:pPr marL="438912" lvl="1" indent="0">
               <a:spcBef>
                 <a:spcPts val="100"/>
               </a:spcBef>
               <a:buNone/>
             </a:pPr>
             <a:r>
-              <a:rPr lang="en-US" sz="1750" dirty="0">
+              <a:rPr lang="en-US" sz="1800" dirty="0">
                 <a:latin typeface="Consolas" panose="020B0609020204030204" pitchFamily="49" charset="0"/>
               </a:rPr>
               <a:t>      {</a:t>
             </a:r>
           </a:p>
           <a:p>
-            <a:pPr marL="457200" lvl="1" indent="0">
+            <a:pPr marL="438912" lvl="1" indent="0">
               <a:spcBef>
                 <a:spcPts val="100"/>
               </a:spcBef>
               <a:buNone/>
             </a:pPr>
             <a:r>
-              <a:rPr lang="en-US" sz="1750" dirty="0">
+              <a:rPr lang="en-US" sz="1800" dirty="0">
                 <a:latin typeface="Consolas" panose="020B0609020204030204" pitchFamily="49" charset="0"/>
               </a:rPr>
               <a:t>        // Selector can be field expression .length (Integer)</a:t>
             </a:r>
           </a:p>
           <a:p>
-            <a:pPr marL="457200" lvl="1" indent="0">
+            <a:pPr marL="438912" lvl="1" indent="0">
               <a:spcBef>
                 <a:spcPts val="100"/>
               </a:spcBef>
               <a:buNone/>
             </a:pPr>
             <a:r>
-              <a:rPr lang="en-US" sz="1750" dirty="0">
+              <a:rPr lang="en-US" sz="1800" dirty="0">
                 <a:latin typeface="Consolas" panose="020B0609020204030204" pitchFamily="49" charset="0"/>
               </a:rPr>
               <a:t>        // or an index expression for the characters (Char).</a:t>
             </a:r>
           </a:p>
           <a:p>
-            <a:pPr marL="457200" lvl="1" indent="0">
+            <a:pPr marL="438912" lvl="1" indent="0">
               <a:spcBef>
                 <a:spcPts val="100"/>
               </a:spcBef>
               <a:buNone/>
             </a:pPr>
             <a:r>
-              <a:rPr lang="en-US" sz="1750" dirty="0">
+              <a:rPr lang="en-US" sz="1800" dirty="0">
                 <a:latin typeface="Consolas" panose="020B0609020204030204" pitchFamily="49" charset="0"/>
               </a:rPr>
               <a:t>        ...</a:t>
             </a:r>
           </a:p>
           <a:p>
-            <a:pPr marL="457200" lvl="1" indent="0">
+            <a:pPr marL="438912" lvl="1" indent="0">
               <a:spcBef>
                 <a:spcPts val="100"/>
               </a:spcBef>
               <a:buNone/>
             </a:pPr>
             <a:r>
-              <a:rPr lang="en-US" sz="1750" dirty="0">
+              <a:rPr lang="en-US" sz="1800" dirty="0">
                 <a:latin typeface="Consolas" panose="020B0609020204030204" pitchFamily="49" charset="0"/>
               </a:rPr>
               <a:t>      }</a:t>
             </a:r>
           </a:p>
           <a:p>
-            <a:pPr marL="457200" lvl="1" indent="0">
+            <a:pPr marL="438912" lvl="1" indent="0">
               <a:spcBef>
                 <a:spcPts val="100"/>
               </a:spcBef>
               <a:buNone/>
             </a:pPr>
             <a:r>
-              <a:rPr lang="en-US" sz="1750" dirty="0">
+              <a:rPr lang="en-US" sz="1800" dirty="0">
                 <a:latin typeface="Consolas" panose="020B0609020204030204" pitchFamily="49" charset="0"/>
               </a:rPr>
               <a:t>    else</a:t>
             </a:r>
           </a:p>
           <a:p>
-            <a:pPr marL="457200" lvl="1" indent="0">
+            <a:pPr marL="438912" lvl="1" indent="0">
               <a:spcBef>
                 <a:spcPts val="100"/>
               </a:spcBef>
               <a:buNone/>
             </a:pPr>
             <a:r>
-              <a:rPr lang="en-US" sz="1750" dirty="0">
+              <a:rPr lang="en-US" sz="1800" dirty="0">
                 <a:latin typeface="Consolas" panose="020B0609020204030204" pitchFamily="49" charset="0"/>
               </a:rPr>
               <a:t>      {</a:t>
             </a:r>
           </a:p>
           <a:p>
-            <a:pPr marL="457200" lvl="1" indent="0">
+            <a:pPr marL="438912" lvl="1" indent="0">
               <a:spcBef>
                 <a:spcPts val="100"/>
               </a:spcBef>
               <a:buNone/>
             </a:pPr>
             <a:r>
-              <a:rPr lang="en-US" sz="1750" dirty="0">
+              <a:rPr lang="en-US" sz="1800" dirty="0">
                 <a:latin typeface="Consolas" panose="020B0609020204030204" pitchFamily="49" charset="0"/>
               </a:rPr>
               <a:t>        var </a:t>
             </a:r>
             <a:r>
-              <a:rPr lang="en-US" sz="1750" dirty="0" err="1">
+              <a:rPr lang="en-US" sz="1800" dirty="0" err="1">
                 <a:latin typeface="Consolas" panose="020B0609020204030204" pitchFamily="49" charset="0"/>
               </a:rPr>
               <a:t>errorMsg</a:t>
             </a:r>
             <a:r>
-              <a:rPr lang="en-US" sz="1750" dirty="0">
+              <a:rPr lang="en-US" sz="1800" dirty="0">
                 <a:latin typeface="Consolas" panose="020B0609020204030204" pitchFamily="49" charset="0"/>
               </a:rPr>
               <a:t> = "Selector expression not allowed ..."</a:t>
             </a:r>
           </a:p>
           <a:p>
-            <a:pPr marL="457200" lvl="1" indent="0">
+            <a:pPr marL="438912" lvl="1" indent="0">
               <a:spcBef>
                 <a:spcPts val="100"/>
               </a:spcBef>
               <a:buNone/>
             </a:pPr>
             <a:r>
-              <a:rPr lang="en-US" sz="1750" dirty="0">
+              <a:rPr lang="en-US" sz="1800" dirty="0">
                 <a:latin typeface="Consolas" panose="020B0609020204030204" pitchFamily="49" charset="0"/>
               </a:rPr>
               <a:t>        throw error(</a:t>
             </a:r>
             <a:r>
-              <a:rPr lang="en-US" sz="1750" dirty="0" err="1">
+              <a:rPr lang="en-US" sz="1800" dirty="0" err="1">
                 <a:latin typeface="Consolas" panose="020B0609020204030204" pitchFamily="49" charset="0"/>
               </a:rPr>
               <a:t>expr.getPosition</a:t>
             </a:r>
             <a:r>
-              <a:rPr lang="en-US" sz="1750" dirty="0">
+              <a:rPr lang="en-US" sz="1800" dirty="0">
                 <a:latin typeface="Consolas" panose="020B0609020204030204" pitchFamily="49" charset="0"/>
               </a:rPr>
               <a:t>(), </a:t>
             </a:r>
             <a:r>
-              <a:rPr lang="en-US" sz="1750" dirty="0" err="1">
+              <a:rPr lang="en-US" sz="1800" dirty="0" err="1">
                 <a:latin typeface="Consolas" panose="020B0609020204030204" pitchFamily="49" charset="0"/>
               </a:rPr>
               <a:t>errorMsg</a:t>
             </a:r>
             <a:r>
-              <a:rPr lang="en-US" sz="1750" dirty="0">
+              <a:rPr lang="en-US" sz="1800" dirty="0">
                 <a:latin typeface="Consolas" panose="020B0609020204030204" pitchFamily="49" charset="0"/>
               </a:rPr>
               <a:t>)</a:t>
             </a:r>
           </a:p>
           <a:p>
-            <a:pPr marL="457200" lvl="1" indent="0">
+            <a:pPr marL="438912" lvl="1" indent="0">
               <a:spcBef>
                 <a:spcPts val="100"/>
               </a:spcBef>
               <a:buNone/>
             </a:pPr>
             <a:r>
-              <a:rPr lang="en-US" sz="1750" dirty="0">
+              <a:rPr lang="en-US" sz="1800" dirty="0">
                 <a:latin typeface="Consolas" panose="020B0609020204030204" pitchFamily="49" charset="0"/>
               </a:rPr>
               <a:t>      }</a:t>
             </a:r>
           </a:p>
           <a:p>
-            <a:pPr marL="457200" lvl="1" indent="0">
+            <a:pPr marL="438912" lvl="1" indent="0">
               <a:spcBef>
                 <a:spcPts val="100"/>
               </a:spcBef>
               <a:buNone/>
             </a:pPr>
             <a:r>
-              <a:rPr lang="en-US" sz="1750" dirty="0">
+              <a:rPr lang="en-US" sz="1800" dirty="0">
                 <a:latin typeface="Consolas" panose="020B0609020204030204" pitchFamily="49" charset="0"/>
               </a:rPr>
               <a:t>  }</a:t>
             </a:r>
           </a:p>
           <a:p>
-            <a:pPr marL="457200" lvl="1" indent="0">
+            <a:pPr marL="438912" lvl="1" indent="0">
               <a:spcBef>
                 <a:spcPts val="100"/>
               </a:spcBef>
               <a:buNone/>
             </a:pPr>
-            <a:endParaRPr lang="en-US" sz="1750" dirty="0">
+            <a:endParaRPr lang="en-US" sz="1800" dirty="0">
               <a:latin typeface="Consolas" panose="020B0609020204030204" pitchFamily="49" charset="0"/>
             </a:endParaRPr>
           </a:p>
@@ -27270,7 +27343,7 @@
     </p:spTree>
     <p:extLst>
       <p:ext uri="{BB962C8B-B14F-4D97-AF65-F5344CB8AC3E}">
-        <p14:creationId xmlns:p14="http://schemas.microsoft.com/office/powerpoint/2010/main" val="2658881417"/>
+        <p14:creationId xmlns:p14="http://schemas.microsoft.com/office/powerpoint/2010/main" val="4248239808"/>
       </p:ext>
     </p:extLst>
   </p:cSld>
@@ -28860,7 +28933,7 @@
                 <a:latin typeface="Consolas" pitchFamily="49" charset="0"/>
                 <a:cs typeface="Consolas" pitchFamily="49" charset="0"/>
               </a:rPr>
-              <a:t>Position </a:t>
+              <a:t>var </a:t>
             </a:r>
             <a:r>
               <a:rPr lang="en-US" sz="1800" dirty="0" err="1">
@@ -28914,18 +28987,11 @@
               <a:buNone/>
             </a:pPr>
             <a:r>
-              <a:rPr lang="en-US" sz="1800" dirty="0" err="1">
+              <a:rPr lang="en-US" sz="1800" dirty="0">
                 <a:latin typeface="Consolas" pitchFamily="49" charset="0"/>
                 <a:cs typeface="Consolas" pitchFamily="49" charset="0"/>
               </a:rPr>
-              <a:t>LoopStmt</a:t>
-            </a:r>
-            <a:r>
-              <a:rPr lang="en-US" sz="1800" dirty="0">
-                <a:latin typeface="Consolas" pitchFamily="49" charset="0"/>
-                <a:cs typeface="Consolas" pitchFamily="49" charset="0"/>
-              </a:rPr>
-              <a:t> </a:t>
+              <a:t>var </a:t>
             </a:r>
             <a:r>
               <a:rPr lang="en-US" sz="1800" dirty="0" err="1">
@@ -29625,8 +29691,8 @@
         </p:nvSpPr>
         <p:spPr>
           <a:xfrm>
-            <a:off x="875796" y="3831431"/>
-            <a:ext cx="7392408" cy="2308324"/>
+            <a:off x="602804" y="3831431"/>
+            <a:ext cx="7938392" cy="1938992"/>
           </a:xfrm>
           <a:prstGeom prst="rect">
             <a:avLst/>
@@ -29672,14 +29738,14 @@
             </a:r>
             <a:r>
               <a:rPr lang="en-US" dirty="0"/>
-              <a:t> expression is not present.  Also, the</a:t>
+              <a:t> expression is not present.  Also,</a:t>
             </a:r>
           </a:p>
           <a:p>
             <a:pPr algn="l"/>
             <a:r>
               <a:rPr lang="en-US" dirty="0"/>
-              <a:t>default constructor initializes field </a:t>
+              <a:t>field </a:t>
             </a:r>
             <a:r>
               <a:rPr lang="en-US" dirty="0">
@@ -29689,16 +29755,12 @@
             </a:r>
             <a:r>
               <a:rPr lang="en-US" dirty="0"/>
-              <a:t> to an</a:t>
+              <a:t> is initialized to an instance of</a:t>
             </a:r>
           </a:p>
           <a:p>
             <a:pPr algn="l"/>
             <a:r>
-              <a:rPr lang="en-US" dirty="0"/>
-              <a:t>instance of </a:t>
-            </a:r>
-            <a:r>
               <a:rPr lang="en-US" dirty="0" err="1">
                 <a:latin typeface="Consolas" panose="020B0609020204030204" pitchFamily="49" charset="0"/>
               </a:rPr>
@@ -29706,27 +29768,21 @@
             </a:r>
             <a:r>
               <a:rPr lang="en-US" dirty="0"/>
-              <a:t>, which is a subclass of</a:t>
-            </a:r>
+              <a:t>, which is a subclass of </a:t>
+            </a:r>
+            <a:r>
+              <a:rPr lang="en-US" dirty="0">
+                <a:latin typeface="Consolas" panose="020B0609020204030204" pitchFamily="49" charset="0"/>
+              </a:rPr>
+              <a:t>Statement</a:t>
+            </a:r>
+            <a:endParaRPr lang="en-US" dirty="0"/>
           </a:p>
           <a:p>
             <a:pPr algn="l"/>
             <a:r>
-              <a:rPr lang="en-US" dirty="0">
-                <a:latin typeface="Consolas" panose="020B0609020204030204" pitchFamily="49" charset="0"/>
-              </a:rPr>
-              <a:t>Statement</a:t>
-            </a:r>
-            <a:r>
-              <a:rPr lang="en-US" dirty="0"/>
-              <a:t> that passes all constraint checks and</a:t>
-            </a:r>
-          </a:p>
-          <a:p>
-            <a:pPr algn="l"/>
-            <a:r>
-              <a:rPr lang="en-US" dirty="0"/>
-              <a:t>generates no code.</a:t>
+              <a:rPr lang="en-US" dirty="0"/>
+              <a:t>that passes all constraint checks and generates no code.</a:t>
             </a:r>
           </a:p>
         </p:txBody>

</xml_diff>

<commit_message>
minor improvements to several slides
</commit_message>
<xml_diff>
--- a/PowerPoints/08 - Abstract Syntax Trees.pptx
+++ b/PowerPoints/08 - Abstract Syntax Trees.pptx
@@ -22487,8 +22487,8 @@
         </p:nvCxnSpPr>
         <p:spPr bwMode="auto">
           <a:xfrm rot="16200000" flipH="1">
-            <a:off x="6554832" y="3298335"/>
-            <a:ext cx="311914" cy="1168616"/>
+            <a:off x="6577897" y="3275269"/>
+            <a:ext cx="311914" cy="1214747"/>
           </a:xfrm>
           <a:prstGeom prst="bentConnector3">
             <a:avLst>
@@ -22752,9 +22752,9 @@
         <p:grpSpPr>
           <a:xfrm>
             <a:off x="6609297" y="4038600"/>
-            <a:ext cx="1371600" cy="584775"/>
+            <a:ext cx="1463862" cy="584775"/>
             <a:chOff x="6672101" y="3200400"/>
-            <a:chExt cx="1371600" cy="584775"/>
+            <a:chExt cx="1463862" cy="584775"/>
           </a:xfrm>
         </p:grpSpPr>
         <p:sp>
@@ -22772,7 +22772,7 @@
           <p:spPr>
             <a:xfrm>
               <a:off x="6672101" y="3200400"/>
-              <a:ext cx="1371600" cy="584775"/>
+              <a:ext cx="1463862" cy="584775"/>
             </a:xfrm>
             <a:prstGeom prst="rect">
               <a:avLst/>
@@ -22797,8 +22797,13 @@
               <a:pPr algn="l"/>
               <a:r>
                 <a:rPr lang="en-US" sz="1600" dirty="0"/>
-                <a:t>  WritelnStmt</a:t>
+                <a:t>  </a:t>
               </a:r>
+              <a:r>
+                <a:rPr lang="en-US" sz="1600" dirty="0" err="1"/>
+                <a:t>OutputStmt</a:t>
+              </a:r>
+              <a:endParaRPr lang="en-US" sz="1600" dirty="0"/>
             </a:p>
             <a:p>
               <a:pPr algn="l"/>

</xml_diff>

<commit_message>
added a new  PowerPoint slide
</commit_message>
<xml_diff>
--- a/PowerPoints/08 - Abstract Syntax Trees.pptx
+++ b/PowerPoints/08 - Abstract Syntax Trees.pptx
@@ -5,10 +5,10 @@
     <p:sldMasterId id="2147483651" r:id="rId1"/>
   </p:sldMasterIdLst>
   <p:notesMasterIdLst>
-    <p:notesMasterId r:id="rId66"/>
+    <p:notesMasterId r:id="rId67"/>
   </p:notesMasterIdLst>
   <p:handoutMasterIdLst>
-    <p:handoutMasterId r:id="rId67"/>
+    <p:handoutMasterId r:id="rId68"/>
   </p:handoutMasterIdLst>
   <p:sldIdLst>
     <p:sldId id="256" r:id="rId2"/>
@@ -74,7 +74,8 @@
     <p:sldId id="290" r:id="rId62"/>
     <p:sldId id="305" r:id="rId63"/>
     <p:sldId id="291" r:id="rId64"/>
-    <p:sldId id="295" r:id="rId65"/>
+    <p:sldId id="370" r:id="rId65"/>
+    <p:sldId id="295" r:id="rId66"/>
   </p:sldIdLst>
   <p:sldSz cx="9144000" cy="6858000" type="screen4x3"/>
   <p:notesSz cx="7315200" cy="9601200"/>
@@ -3864,7 +3865,7 @@
               <a:pPr>
                 <a:defRPr/>
               </a:pPr>
-              <a:t>64</a:t>
+              <a:t>65</a:t>
             </a:fld>
             <a:endParaRPr lang="en-US" dirty="0"/>
           </a:p>
@@ -29545,6 +29546,319 @@
       </p:grpSpPr>
       <p:sp>
         <p:nvSpPr>
+          <p:cNvPr id="2" name="Title 1">
+            <a:extLst>
+              <a:ext uri="{FF2B5EF4-FFF2-40B4-BE49-F238E27FC236}">
+                <a16:creationId xmlns:a16="http://schemas.microsoft.com/office/drawing/2014/main" id="{9F234138-0CFD-3601-B29E-C7A3C3D559AB}"/>
+              </a:ext>
+            </a:extLst>
+          </p:cNvPr>
+          <p:cNvSpPr>
+            <a:spLocks noGrp="1"/>
+          </p:cNvSpPr>
+          <p:nvPr>
+            <p:ph type="title"/>
+          </p:nvPr>
+        </p:nvSpPr>
+        <p:spPr/>
+        <p:txBody>
+          <a:bodyPr/>
+          <a:lstStyle/>
+          <a:p>
+            <a:r>
+              <a:rPr lang="en-US" dirty="0"/>
+              <a:t>Do We Need Context Classes?</a:t>
+            </a:r>
+          </a:p>
+        </p:txBody>
+      </p:sp>
+      <p:sp>
+        <p:nvSpPr>
+          <p:cNvPr id="3" name="Content Placeholder 2">
+            <a:extLst>
+              <a:ext uri="{FF2B5EF4-FFF2-40B4-BE49-F238E27FC236}">
+                <a16:creationId xmlns:a16="http://schemas.microsoft.com/office/drawing/2014/main" id="{FD9ED470-9AD3-F4D9-01A0-51FA668E9DD7}"/>
+              </a:ext>
+            </a:extLst>
+          </p:cNvPr>
+          <p:cNvSpPr>
+            <a:spLocks noGrp="1"/>
+          </p:cNvSpPr>
+          <p:nvPr>
+            <p:ph idx="1"/>
+          </p:nvPr>
+        </p:nvSpPr>
+        <p:spPr/>
+        <p:txBody>
+          <a:bodyPr/>
+          <a:lstStyle/>
+          <a:p>
+            <a:r>
+              <a:rPr lang="en-US" sz="2400" dirty="0">
+                <a:effectLst/>
+                <a:latin typeface="+mn-lt"/>
+                <a:ea typeface="Calibri" panose="020F0502020204030204" pitchFamily="34" charset="0"/>
+                <a:cs typeface="Times New Roman" panose="02020603050405020304" pitchFamily="18" charset="0"/>
+              </a:rPr>
+              <a:t>Class </a:t>
+            </a:r>
+            <a:r>
+              <a:rPr lang="en-US" sz="2400" dirty="0" err="1">
+                <a:effectLst/>
+                <a:latin typeface="Consolas" panose="020B0609020204030204" pitchFamily="49" charset="0"/>
+                <a:ea typeface="Calibri" panose="020F0502020204030204" pitchFamily="34" charset="0"/>
+                <a:cs typeface="Times New Roman" panose="02020603050405020304" pitchFamily="18" charset="0"/>
+              </a:rPr>
+              <a:t>LoopContext</a:t>
+            </a:r>
+            <a:r>
+              <a:rPr lang="en-US" sz="2400" dirty="0">
+                <a:effectLst/>
+                <a:latin typeface="+mn-lt"/>
+                <a:ea typeface="Calibri" panose="020F0502020204030204" pitchFamily="34" charset="0"/>
+                <a:cs typeface="Times New Roman" panose="02020603050405020304" pitchFamily="18" charset="0"/>
+              </a:rPr>
+              <a:t> exists solely to help associate an </a:t>
+            </a:r>
+            <a:r>
+              <a:rPr lang="en-US" sz="2400" dirty="0">
+                <a:effectLst/>
+                <a:latin typeface="Consolas" panose="020B0609020204030204" pitchFamily="49" charset="0"/>
+                <a:ea typeface="Calibri" panose="020F0502020204030204" pitchFamily="34" charset="0"/>
+                <a:cs typeface="Times New Roman" panose="02020603050405020304" pitchFamily="18" charset="0"/>
+              </a:rPr>
+              <a:t>exit</a:t>
+            </a:r>
+            <a:r>
+              <a:rPr lang="en-US" sz="2400" dirty="0">
+                <a:effectLst/>
+                <a:latin typeface="+mn-lt"/>
+                <a:ea typeface="Calibri" panose="020F0502020204030204" pitchFamily="34" charset="0"/>
+                <a:cs typeface="Times New Roman" panose="02020603050405020304" pitchFamily="18" charset="0"/>
+              </a:rPr>
+              <a:t> statement with its enclosing </a:t>
+            </a:r>
+            <a:r>
+              <a:rPr lang="en-US" sz="2400" dirty="0">
+                <a:effectLst/>
+                <a:latin typeface="Consolas" panose="020B0609020204030204" pitchFamily="49" charset="0"/>
+                <a:ea typeface="Calibri" panose="020F0502020204030204" pitchFamily="34" charset="0"/>
+                <a:cs typeface="Times New Roman" panose="02020603050405020304" pitchFamily="18" charset="0"/>
+              </a:rPr>
+              <a:t>loop</a:t>
+            </a:r>
+            <a:r>
+              <a:rPr lang="en-US" sz="2400" dirty="0">
+                <a:effectLst/>
+                <a:latin typeface="+mn-lt"/>
+                <a:ea typeface="Calibri" panose="020F0502020204030204" pitchFamily="34" charset="0"/>
+                <a:cs typeface="Times New Roman" panose="02020603050405020304" pitchFamily="18" charset="0"/>
+              </a:rPr>
+              <a:t> statement</a:t>
+            </a:r>
+          </a:p>
+          <a:p>
+            <a:r>
+              <a:rPr lang="en-US" dirty="0">
+                <a:ea typeface="Calibri" panose="020F0502020204030204" pitchFamily="34" charset="0"/>
+                <a:cs typeface="Times New Roman" panose="02020603050405020304" pitchFamily="18" charset="0"/>
+              </a:rPr>
+              <a:t>C</a:t>
+            </a:r>
+            <a:r>
+              <a:rPr lang="en-US" sz="2400" dirty="0">
+                <a:effectLst/>
+                <a:latin typeface="+mn-lt"/>
+                <a:ea typeface="Calibri" panose="020F0502020204030204" pitchFamily="34" charset="0"/>
+                <a:cs typeface="Times New Roman" panose="02020603050405020304" pitchFamily="18" charset="0"/>
+              </a:rPr>
+              <a:t>lass </a:t>
+            </a:r>
+            <a:r>
+              <a:rPr lang="en-US" sz="2400" dirty="0" err="1">
+                <a:effectLst/>
+                <a:latin typeface="Consolas" panose="020B0609020204030204" pitchFamily="49" charset="0"/>
+                <a:ea typeface="Calibri" panose="020F0502020204030204" pitchFamily="34" charset="0"/>
+                <a:cs typeface="Times New Roman" panose="02020603050405020304" pitchFamily="18" charset="0"/>
+              </a:rPr>
+              <a:t>SubprogramContext</a:t>
+            </a:r>
+            <a:r>
+              <a:rPr lang="en-US" sz="2400" dirty="0">
+                <a:effectLst/>
+                <a:latin typeface="+mn-lt"/>
+                <a:ea typeface="Calibri" panose="020F0502020204030204" pitchFamily="34" charset="0"/>
+                <a:cs typeface="Times New Roman" panose="02020603050405020304" pitchFamily="18" charset="0"/>
+              </a:rPr>
+              <a:t> exists solely to help associate a return statement with its enclosing subprogram.</a:t>
+            </a:r>
+          </a:p>
+          <a:p>
+            <a:r>
+              <a:rPr lang="en-US" sz="2400" dirty="0">
+                <a:effectLst/>
+                <a:latin typeface="+mn-lt"/>
+                <a:ea typeface="Calibri" panose="020F0502020204030204" pitchFamily="34" charset="0"/>
+                <a:cs typeface="Times New Roman" panose="02020603050405020304" pitchFamily="18" charset="0"/>
+              </a:rPr>
+              <a:t>Both classes can be eliminated if we had parent references to the AST classes.</a:t>
+            </a:r>
+          </a:p>
+          <a:p>
+            <a:r>
+              <a:rPr lang="en-US" sz="2400" dirty="0">
+                <a:effectLst/>
+                <a:latin typeface="+mn-lt"/>
+                <a:ea typeface="Calibri" panose="020F0502020204030204" pitchFamily="34" charset="0"/>
+                <a:cs typeface="Times New Roman" panose="02020603050405020304" pitchFamily="18" charset="0"/>
+              </a:rPr>
+              <a:t>For example, if parent references existed, an </a:t>
+            </a:r>
+            <a:r>
+              <a:rPr lang="en-US" sz="2400" dirty="0">
+                <a:effectLst/>
+                <a:latin typeface="Consolas" panose="020B0609020204030204" pitchFamily="49" charset="0"/>
+                <a:ea typeface="Calibri" panose="020F0502020204030204" pitchFamily="34" charset="0"/>
+                <a:cs typeface="Times New Roman" panose="02020603050405020304" pitchFamily="18" charset="0"/>
+              </a:rPr>
+              <a:t>exit</a:t>
+            </a:r>
+            <a:r>
+              <a:rPr lang="en-US" sz="2400" dirty="0">
+                <a:effectLst/>
+                <a:latin typeface="+mn-lt"/>
+                <a:ea typeface="Calibri" panose="020F0502020204030204" pitchFamily="34" charset="0"/>
+                <a:cs typeface="Times New Roman" panose="02020603050405020304" pitchFamily="18" charset="0"/>
+              </a:rPr>
+              <a:t> statement could simply follow the chain of parent references to find its enclosing </a:t>
+            </a:r>
+            <a:r>
+              <a:rPr lang="en-US" sz="2400" dirty="0">
+                <a:effectLst/>
+                <a:latin typeface="Consolas" panose="020B0609020204030204" pitchFamily="49" charset="0"/>
+                <a:ea typeface="Calibri" panose="020F0502020204030204" pitchFamily="34" charset="0"/>
+                <a:cs typeface="Times New Roman" panose="02020603050405020304" pitchFamily="18" charset="0"/>
+              </a:rPr>
+              <a:t>loop</a:t>
+            </a:r>
+            <a:r>
+              <a:rPr lang="en-US" sz="2400" dirty="0">
+                <a:effectLst/>
+                <a:latin typeface="+mn-lt"/>
+                <a:ea typeface="Calibri" panose="020F0502020204030204" pitchFamily="34" charset="0"/>
+                <a:cs typeface="Times New Roman" panose="02020603050405020304" pitchFamily="18" charset="0"/>
+              </a:rPr>
+              <a:t> statement.</a:t>
+            </a:r>
+          </a:p>
+          <a:p>
+            <a:endParaRPr lang="en-US" dirty="0"/>
+          </a:p>
+        </p:txBody>
+      </p:sp>
+      <p:sp>
+        <p:nvSpPr>
+          <p:cNvPr id="4" name="Footer Placeholder 3">
+            <a:extLst>
+              <a:ext uri="{FF2B5EF4-FFF2-40B4-BE49-F238E27FC236}">
+                <a16:creationId xmlns:a16="http://schemas.microsoft.com/office/drawing/2014/main" id="{B15E7607-756B-E94D-CAA6-5A1732CC67A6}"/>
+              </a:ext>
+            </a:extLst>
+          </p:cNvPr>
+          <p:cNvSpPr>
+            <a:spLocks noGrp="1"/>
+          </p:cNvSpPr>
+          <p:nvPr>
+            <p:ph type="ftr" sz="quarter" idx="10"/>
+          </p:nvPr>
+        </p:nvSpPr>
+        <p:spPr/>
+        <p:txBody>
+          <a:bodyPr/>
+          <a:lstStyle/>
+          <a:p>
+            <a:pPr>
+              <a:defRPr/>
+            </a:pPr>
+            <a:r>
+              <a:rPr lang="en-US"/>
+              <a:t>©SoftMoore Consulting</a:t>
+            </a:r>
+            <a:endParaRPr lang="en-US" dirty="0"/>
+          </a:p>
+        </p:txBody>
+      </p:sp>
+      <p:sp>
+        <p:nvSpPr>
+          <p:cNvPr id="5" name="Slide Number Placeholder 4">
+            <a:extLst>
+              <a:ext uri="{FF2B5EF4-FFF2-40B4-BE49-F238E27FC236}">
+                <a16:creationId xmlns:a16="http://schemas.microsoft.com/office/drawing/2014/main" id="{A2812B25-AE0A-8A36-6F54-C72891589010}"/>
+              </a:ext>
+            </a:extLst>
+          </p:cNvPr>
+          <p:cNvSpPr>
+            <a:spLocks noGrp="1"/>
+          </p:cNvSpPr>
+          <p:nvPr>
+            <p:ph type="sldNum" sz="quarter" idx="11"/>
+          </p:nvPr>
+        </p:nvSpPr>
+        <p:spPr/>
+        <p:txBody>
+          <a:bodyPr/>
+          <a:lstStyle/>
+          <a:p>
+            <a:pPr>
+              <a:defRPr/>
+            </a:pPr>
+            <a:r>
+              <a:rPr lang="en-US"/>
+              <a:t>Slide </a:t>
+            </a:r>
+            <a:fld id="{A413A2F6-7BFD-463C-B63A-922040FAF32C}" type="slidenum">
+              <a:rPr lang="en-US" smtClean="0"/>
+              <a:pPr>
+                <a:defRPr/>
+              </a:pPr>
+              <a:t>64</a:t>
+            </a:fld>
+            <a:endParaRPr lang="en-US" dirty="0"/>
+          </a:p>
+        </p:txBody>
+      </p:sp>
+    </p:spTree>
+    <p:extLst>
+      <p:ext uri="{BB962C8B-B14F-4D97-AF65-F5344CB8AC3E}">
+        <p14:creationId xmlns:p14="http://schemas.microsoft.com/office/powerpoint/2010/main" val="793309909"/>
+      </p:ext>
+    </p:extLst>
+  </p:cSld>
+  <p:clrMapOvr>
+    <a:masterClrMapping/>
+  </p:clrMapOvr>
+</p:sld>
+</file>
+
+<file path=ppt/slides/slide65.xml><?xml version="1.0" encoding="utf-8"?>
+<p:sld xmlns:a="http://schemas.openxmlformats.org/drawingml/2006/main" xmlns:r="http://schemas.openxmlformats.org/officeDocument/2006/relationships" xmlns:p="http://schemas.openxmlformats.org/presentationml/2006/main">
+  <p:cSld>
+    <p:spTree>
+      <p:nvGrpSpPr>
+        <p:cNvPr id="1" name=""/>
+        <p:cNvGrpSpPr/>
+        <p:nvPr/>
+      </p:nvGrpSpPr>
+      <p:grpSpPr>
+        <a:xfrm>
+          <a:off x="0" y="0"/>
+          <a:ext cx="0" cy="0"/>
+          <a:chOff x="0" y="0"/>
+          <a:chExt cx="0" cy="0"/>
+        </a:xfrm>
+      </p:grpSpPr>
+      <p:sp>
+        <p:nvSpPr>
           <p:cNvPr id="16386" name="Footer Placeholder 3"/>
           <p:cNvSpPr>
             <a:spLocks noGrp="1"/>
@@ -29591,7 +29905,7 @@
             <a:fld id="{134458ED-4E89-4858-9DDE-3B7F8D65D42C}" type="slidenum">
               <a:rPr lang="en-US" smtClean="0"/>
               <a:pPr/>
-              <a:t>64</a:t>
+              <a:t>65</a:t>
             </a:fld>
             <a:endParaRPr lang="en-US" dirty="0"/>
           </a:p>

</xml_diff>